<commit_message>
done till user add update delete
</commit_message>
<xml_diff>
--- a/GUI_project_requirement.pptx
+++ b/GUI_project_requirement.pptx
@@ -75,7 +75,7 @@
         <p:spPr>
           <a:xfrm>
             <a:off x="1523880" y="1122480"/>
-            <a:ext cx="9143280" cy="2386800"/>
+            <a:ext cx="9142920" cy="2386440"/>
           </a:xfrm>
           <a:prstGeom prst="rect">
             <a:avLst/>
@@ -104,7 +104,7 @@
         <p:spPr>
           <a:xfrm>
             <a:off x="609480" y="1604520"/>
-            <a:ext cx="10972440" cy="1896840"/>
+            <a:ext cx="10972080" cy="1896840"/>
           </a:xfrm>
           <a:prstGeom prst="rect">
             <a:avLst/>
@@ -134,7 +134,7 @@
         <p:spPr>
           <a:xfrm>
             <a:off x="609480" y="3682080"/>
-            <a:ext cx="10972440" cy="1896840"/>
+            <a:ext cx="10972080" cy="1896840"/>
           </a:xfrm>
           <a:prstGeom prst="rect">
             <a:avLst/>
@@ -186,7 +186,7 @@
         <p:spPr>
           <a:xfrm>
             <a:off x="1523880" y="1122480"/>
-            <a:ext cx="9143280" cy="2386800"/>
+            <a:ext cx="9142920" cy="2386440"/>
           </a:xfrm>
           <a:prstGeom prst="rect">
             <a:avLst/>
@@ -357,7 +357,7 @@
         <p:spPr>
           <a:xfrm>
             <a:off x="1523880" y="1122480"/>
-            <a:ext cx="9143280" cy="2386800"/>
+            <a:ext cx="9142920" cy="2386440"/>
           </a:xfrm>
           <a:prstGeom prst="rect">
             <a:avLst/>
@@ -386,7 +386,7 @@
         <p:spPr>
           <a:xfrm>
             <a:off x="609480" y="1604520"/>
-            <a:ext cx="3533040" cy="1896840"/>
+            <a:ext cx="3532680" cy="1896840"/>
           </a:xfrm>
           <a:prstGeom prst="rect">
             <a:avLst/>
@@ -415,8 +415,8 @@
         </p:nvSpPr>
         <p:spPr>
           <a:xfrm>
-            <a:off x="4319640" y="1604520"/>
-            <a:ext cx="3533040" cy="1896840"/>
+            <a:off x="4319280" y="1604520"/>
+            <a:ext cx="3532680" cy="1896840"/>
           </a:xfrm>
           <a:prstGeom prst="rect">
             <a:avLst/>
@@ -445,8 +445,8 @@
         </p:nvSpPr>
         <p:spPr>
           <a:xfrm>
-            <a:off x="8029800" y="1604520"/>
-            <a:ext cx="3533040" cy="1896840"/>
+            <a:off x="8028720" y="1604520"/>
+            <a:ext cx="3532680" cy="1896840"/>
           </a:xfrm>
           <a:prstGeom prst="rect">
             <a:avLst/>
@@ -476,7 +476,7 @@
         <p:spPr>
           <a:xfrm>
             <a:off x="609480" y="3682080"/>
-            <a:ext cx="3533040" cy="1896840"/>
+            <a:ext cx="3532680" cy="1896840"/>
           </a:xfrm>
           <a:prstGeom prst="rect">
             <a:avLst/>
@@ -505,8 +505,8 @@
         </p:nvSpPr>
         <p:spPr>
           <a:xfrm>
-            <a:off x="4319640" y="3682080"/>
-            <a:ext cx="3533040" cy="1896840"/>
+            <a:off x="4319280" y="3682080"/>
+            <a:ext cx="3532680" cy="1896840"/>
           </a:xfrm>
           <a:prstGeom prst="rect">
             <a:avLst/>
@@ -535,8 +535,8 @@
         </p:nvSpPr>
         <p:spPr>
           <a:xfrm>
-            <a:off x="8029800" y="3682080"/>
-            <a:ext cx="3533040" cy="1896840"/>
+            <a:off x="8028720" y="3682080"/>
+            <a:ext cx="3532680" cy="1896840"/>
           </a:xfrm>
           <a:prstGeom prst="rect">
             <a:avLst/>
@@ -610,7 +610,7 @@
         <p:spPr>
           <a:xfrm>
             <a:off x="1523880" y="1122480"/>
-            <a:ext cx="9143280" cy="2386800"/>
+            <a:ext cx="9142920" cy="2386440"/>
           </a:xfrm>
           <a:prstGeom prst="rect">
             <a:avLst/>
@@ -639,7 +639,7 @@
         <p:spPr>
           <a:xfrm>
             <a:off x="609480" y="1604520"/>
-            <a:ext cx="10972440" cy="3977280"/>
+            <a:ext cx="10972080" cy="3976920"/>
           </a:xfrm>
           <a:prstGeom prst="rect">
             <a:avLst/>
@@ -690,7 +690,7 @@
         <p:spPr>
           <a:xfrm>
             <a:off x="1523880" y="1122480"/>
-            <a:ext cx="9143280" cy="2386800"/>
+            <a:ext cx="9142920" cy="2386440"/>
           </a:xfrm>
           <a:prstGeom prst="rect">
             <a:avLst/>
@@ -719,7 +719,7 @@
         <p:spPr>
           <a:xfrm>
             <a:off x="609480" y="1604520"/>
-            <a:ext cx="10972440" cy="3977280"/>
+            <a:ext cx="10972080" cy="3976920"/>
           </a:xfrm>
           <a:prstGeom prst="rect">
             <a:avLst/>
@@ -771,7 +771,7 @@
         <p:spPr>
           <a:xfrm>
             <a:off x="1523880" y="1122480"/>
-            <a:ext cx="9143280" cy="2386800"/>
+            <a:ext cx="9142920" cy="2386440"/>
           </a:xfrm>
           <a:prstGeom prst="rect">
             <a:avLst/>
@@ -800,7 +800,7 @@
         <p:spPr>
           <a:xfrm>
             <a:off x="609480" y="1604520"/>
-            <a:ext cx="5354280" cy="3977280"/>
+            <a:ext cx="5354280" cy="3976920"/>
           </a:xfrm>
           <a:prstGeom prst="rect">
             <a:avLst/>
@@ -830,7 +830,7 @@
         <p:spPr>
           <a:xfrm>
             <a:off x="6231960" y="1604520"/>
-            <a:ext cx="5354280" cy="3977280"/>
+            <a:ext cx="5354280" cy="3976920"/>
           </a:xfrm>
           <a:prstGeom prst="rect">
             <a:avLst/>
@@ -882,7 +882,7 @@
         <p:spPr>
           <a:xfrm>
             <a:off x="1523880" y="1122480"/>
-            <a:ext cx="9143280" cy="2386800"/>
+            <a:ext cx="9142920" cy="2386440"/>
           </a:xfrm>
           <a:prstGeom prst="rect">
             <a:avLst/>
@@ -933,7 +933,7 @@
         <p:spPr>
           <a:xfrm>
             <a:off x="1523880" y="1122480"/>
-            <a:ext cx="9143280" cy="11064960"/>
+            <a:ext cx="9142920" cy="11063520"/>
           </a:xfrm>
           <a:prstGeom prst="rect">
             <a:avLst/>
@@ -984,7 +984,7 @@
         <p:spPr>
           <a:xfrm>
             <a:off x="1523880" y="1122480"/>
-            <a:ext cx="9143280" cy="2386800"/>
+            <a:ext cx="9142920" cy="2386440"/>
           </a:xfrm>
           <a:prstGeom prst="rect">
             <a:avLst/>
@@ -1043,7 +1043,7 @@
         <p:spPr>
           <a:xfrm>
             <a:off x="6231960" y="1604520"/>
-            <a:ext cx="5354280" cy="3977280"/>
+            <a:ext cx="5354280" cy="3976920"/>
           </a:xfrm>
           <a:prstGeom prst="rect">
             <a:avLst/>
@@ -1125,7 +1125,7 @@
         <p:spPr>
           <a:xfrm>
             <a:off x="1523880" y="1122480"/>
-            <a:ext cx="9143280" cy="2386800"/>
+            <a:ext cx="9142920" cy="2386440"/>
           </a:xfrm>
           <a:prstGeom prst="rect">
             <a:avLst/>
@@ -1154,7 +1154,7 @@
         <p:spPr>
           <a:xfrm>
             <a:off x="609480" y="1604520"/>
-            <a:ext cx="10972440" cy="3977280"/>
+            <a:ext cx="10972080" cy="3976920"/>
           </a:xfrm>
           <a:prstGeom prst="rect">
             <a:avLst/>
@@ -1205,7 +1205,7 @@
         <p:spPr>
           <a:xfrm>
             <a:off x="1523880" y="1122480"/>
-            <a:ext cx="9143280" cy="2386800"/>
+            <a:ext cx="9142920" cy="2386440"/>
           </a:xfrm>
           <a:prstGeom prst="rect">
             <a:avLst/>
@@ -1234,7 +1234,7 @@
         <p:spPr>
           <a:xfrm>
             <a:off x="609480" y="1604520"/>
-            <a:ext cx="5354280" cy="3977280"/>
+            <a:ext cx="5354280" cy="3976920"/>
           </a:xfrm>
           <a:prstGeom prst="rect">
             <a:avLst/>
@@ -1346,7 +1346,7 @@
         <p:spPr>
           <a:xfrm>
             <a:off x="1523880" y="1122480"/>
-            <a:ext cx="9143280" cy="2386800"/>
+            <a:ext cx="9142920" cy="2386440"/>
           </a:xfrm>
           <a:prstGeom prst="rect">
             <a:avLst/>
@@ -1435,7 +1435,7 @@
         <p:spPr>
           <a:xfrm>
             <a:off x="609480" y="3682080"/>
-            <a:ext cx="10972440" cy="1896840"/>
+            <a:ext cx="10972080" cy="1896840"/>
           </a:xfrm>
           <a:prstGeom prst="rect">
             <a:avLst/>
@@ -1487,7 +1487,7 @@
         <p:spPr>
           <a:xfrm>
             <a:off x="1523880" y="1122480"/>
-            <a:ext cx="9143280" cy="2386800"/>
+            <a:ext cx="9142920" cy="2386440"/>
           </a:xfrm>
           <a:prstGeom prst="rect">
             <a:avLst/>
@@ -1516,7 +1516,7 @@
         <p:spPr>
           <a:xfrm>
             <a:off x="609480" y="1604520"/>
-            <a:ext cx="10972440" cy="1896840"/>
+            <a:ext cx="10972080" cy="1896840"/>
           </a:xfrm>
           <a:prstGeom prst="rect">
             <a:avLst/>
@@ -1546,7 +1546,7 @@
         <p:spPr>
           <a:xfrm>
             <a:off x="609480" y="3682080"/>
-            <a:ext cx="10972440" cy="1896840"/>
+            <a:ext cx="10972080" cy="1896840"/>
           </a:xfrm>
           <a:prstGeom prst="rect">
             <a:avLst/>
@@ -1598,7 +1598,7 @@
         <p:spPr>
           <a:xfrm>
             <a:off x="1523880" y="1122480"/>
-            <a:ext cx="9143280" cy="2386800"/>
+            <a:ext cx="9142920" cy="2386440"/>
           </a:xfrm>
           <a:prstGeom prst="rect">
             <a:avLst/>
@@ -1769,7 +1769,7 @@
         <p:spPr>
           <a:xfrm>
             <a:off x="1523880" y="1122480"/>
-            <a:ext cx="9143280" cy="2386800"/>
+            <a:ext cx="9142920" cy="2386440"/>
           </a:xfrm>
           <a:prstGeom prst="rect">
             <a:avLst/>
@@ -1798,7 +1798,7 @@
         <p:spPr>
           <a:xfrm>
             <a:off x="609480" y="1604520"/>
-            <a:ext cx="3533040" cy="1896840"/>
+            <a:ext cx="3532680" cy="1896840"/>
           </a:xfrm>
           <a:prstGeom prst="rect">
             <a:avLst/>
@@ -1827,8 +1827,8 @@
         </p:nvSpPr>
         <p:spPr>
           <a:xfrm>
-            <a:off x="4319640" y="1604520"/>
-            <a:ext cx="3533040" cy="1896840"/>
+            <a:off x="4319280" y="1604520"/>
+            <a:ext cx="3532680" cy="1896840"/>
           </a:xfrm>
           <a:prstGeom prst="rect">
             <a:avLst/>
@@ -1857,8 +1857,8 @@
         </p:nvSpPr>
         <p:spPr>
           <a:xfrm>
-            <a:off x="8029800" y="1604520"/>
-            <a:ext cx="3533040" cy="1896840"/>
+            <a:off x="8028720" y="1604520"/>
+            <a:ext cx="3532680" cy="1896840"/>
           </a:xfrm>
           <a:prstGeom prst="rect">
             <a:avLst/>
@@ -1888,7 +1888,7 @@
         <p:spPr>
           <a:xfrm>
             <a:off x="609480" y="3682080"/>
-            <a:ext cx="3533040" cy="1896840"/>
+            <a:ext cx="3532680" cy="1896840"/>
           </a:xfrm>
           <a:prstGeom prst="rect">
             <a:avLst/>
@@ -1917,8 +1917,8 @@
         </p:nvSpPr>
         <p:spPr>
           <a:xfrm>
-            <a:off x="4319640" y="3682080"/>
-            <a:ext cx="3533040" cy="1896840"/>
+            <a:off x="4319280" y="3682080"/>
+            <a:ext cx="3532680" cy="1896840"/>
           </a:xfrm>
           <a:prstGeom prst="rect">
             <a:avLst/>
@@ -1947,8 +1947,8 @@
         </p:nvSpPr>
         <p:spPr>
           <a:xfrm>
-            <a:off x="8029800" y="3682080"/>
-            <a:ext cx="3533040" cy="1896840"/>
+            <a:off x="8028720" y="3682080"/>
+            <a:ext cx="3532680" cy="1896840"/>
           </a:xfrm>
           <a:prstGeom prst="rect">
             <a:avLst/>
@@ -2000,7 +2000,7 @@
         <p:spPr>
           <a:xfrm>
             <a:off x="1523880" y="1122480"/>
-            <a:ext cx="9143280" cy="2386800"/>
+            <a:ext cx="9142920" cy="2386440"/>
           </a:xfrm>
           <a:prstGeom prst="rect">
             <a:avLst/>
@@ -2029,7 +2029,7 @@
         <p:spPr>
           <a:xfrm>
             <a:off x="609480" y="1604520"/>
-            <a:ext cx="10972440" cy="3977280"/>
+            <a:ext cx="10972080" cy="3976920"/>
           </a:xfrm>
           <a:prstGeom prst="rect">
             <a:avLst/>
@@ -2081,7 +2081,7 @@
         <p:spPr>
           <a:xfrm>
             <a:off x="1523880" y="1122480"/>
-            <a:ext cx="9143280" cy="2386800"/>
+            <a:ext cx="9142920" cy="2386440"/>
           </a:xfrm>
           <a:prstGeom prst="rect">
             <a:avLst/>
@@ -2110,7 +2110,7 @@
         <p:spPr>
           <a:xfrm>
             <a:off x="609480" y="1604520"/>
-            <a:ext cx="5354280" cy="3977280"/>
+            <a:ext cx="5354280" cy="3976920"/>
           </a:xfrm>
           <a:prstGeom prst="rect">
             <a:avLst/>
@@ -2140,7 +2140,7 @@
         <p:spPr>
           <a:xfrm>
             <a:off x="6231960" y="1604520"/>
-            <a:ext cx="5354280" cy="3977280"/>
+            <a:ext cx="5354280" cy="3976920"/>
           </a:xfrm>
           <a:prstGeom prst="rect">
             <a:avLst/>
@@ -2192,7 +2192,7 @@
         <p:spPr>
           <a:xfrm>
             <a:off x="1523880" y="1122480"/>
-            <a:ext cx="9143280" cy="2386800"/>
+            <a:ext cx="9142920" cy="2386440"/>
           </a:xfrm>
           <a:prstGeom prst="rect">
             <a:avLst/>
@@ -2243,7 +2243,7 @@
         <p:spPr>
           <a:xfrm>
             <a:off x="1523880" y="1122480"/>
-            <a:ext cx="9143280" cy="11064960"/>
+            <a:ext cx="9142920" cy="11063520"/>
           </a:xfrm>
           <a:prstGeom prst="rect">
             <a:avLst/>
@@ -2294,7 +2294,7 @@
         <p:spPr>
           <a:xfrm>
             <a:off x="1523880" y="1122480"/>
-            <a:ext cx="9143280" cy="2386800"/>
+            <a:ext cx="9142920" cy="2386440"/>
           </a:xfrm>
           <a:prstGeom prst="rect">
             <a:avLst/>
@@ -2353,7 +2353,7 @@
         <p:spPr>
           <a:xfrm>
             <a:off x="6231960" y="1604520"/>
-            <a:ext cx="5354280" cy="3977280"/>
+            <a:ext cx="5354280" cy="3976920"/>
           </a:xfrm>
           <a:prstGeom prst="rect">
             <a:avLst/>
@@ -2435,7 +2435,7 @@
         <p:spPr>
           <a:xfrm>
             <a:off x="1523880" y="1122480"/>
-            <a:ext cx="9143280" cy="2386800"/>
+            <a:ext cx="9142920" cy="2386440"/>
           </a:xfrm>
           <a:prstGeom prst="rect">
             <a:avLst/>
@@ -2464,7 +2464,7 @@
         <p:spPr>
           <a:xfrm>
             <a:off x="609480" y="1604520"/>
-            <a:ext cx="5354280" cy="3977280"/>
+            <a:ext cx="5354280" cy="3976920"/>
           </a:xfrm>
           <a:prstGeom prst="rect">
             <a:avLst/>
@@ -2576,7 +2576,7 @@
         <p:spPr>
           <a:xfrm>
             <a:off x="1523880" y="1122480"/>
-            <a:ext cx="9143280" cy="2386800"/>
+            <a:ext cx="9142920" cy="2386440"/>
           </a:xfrm>
           <a:prstGeom prst="rect">
             <a:avLst/>
@@ -2665,7 +2665,7 @@
         <p:spPr>
           <a:xfrm>
             <a:off x="609480" y="3682080"/>
-            <a:ext cx="10972440" cy="1896840"/>
+            <a:ext cx="10972080" cy="1896840"/>
           </a:xfrm>
           <a:prstGeom prst="rect">
             <a:avLst/>
@@ -2723,8 +2723,362 @@
         </p:nvSpPr>
         <p:spPr>
           <a:xfrm>
+            <a:off x="609480" y="273600"/>
+            <a:ext cx="10972440" cy="1144800"/>
+          </a:xfrm>
+          <a:prstGeom prst="rect">
+            <a:avLst/>
+          </a:prstGeom>
+        </p:spPr>
+        <p:txBody>
+          <a:bodyPr lIns="0" rIns="0" tIns="0" bIns="0" anchor="ctr"/>
+          <a:p>
+            <a:pPr algn="ctr"/>
+            <a:r>
+              <a:rPr b="0" lang="en-IN" sz="4400" spc="-1" strike="noStrike">
+                <a:latin typeface="Arial"/>
+              </a:rPr>
+              <a:t>Cl</a:t>
+            </a:r>
+            <a:r>
+              <a:rPr b="0" lang="en-IN" sz="4400" spc="-1" strike="noStrike">
+                <a:latin typeface="Arial"/>
+              </a:rPr>
+              <a:t>ic</a:t>
+            </a:r>
+            <a:r>
+              <a:rPr b="0" lang="en-IN" sz="4400" spc="-1" strike="noStrike">
+                <a:latin typeface="Arial"/>
+              </a:rPr>
+              <a:t>k </a:t>
+            </a:r>
+            <a:r>
+              <a:rPr b="0" lang="en-IN" sz="4400" spc="-1" strike="noStrike">
+                <a:latin typeface="Arial"/>
+              </a:rPr>
+              <a:t>to </a:t>
+            </a:r>
+            <a:r>
+              <a:rPr b="0" lang="en-IN" sz="4400" spc="-1" strike="noStrike">
+                <a:latin typeface="Arial"/>
+              </a:rPr>
+              <a:t>e</a:t>
+            </a:r>
+            <a:r>
+              <a:rPr b="0" lang="en-IN" sz="4400" spc="-1" strike="noStrike">
+                <a:latin typeface="Arial"/>
+              </a:rPr>
+              <a:t>di</a:t>
+            </a:r>
+            <a:r>
+              <a:rPr b="0" lang="en-IN" sz="4400" spc="-1" strike="noStrike">
+                <a:latin typeface="Arial"/>
+              </a:rPr>
+              <a:t>t </a:t>
+            </a:r>
+            <a:r>
+              <a:rPr b="0" lang="en-IN" sz="4400" spc="-1" strike="noStrike">
+                <a:latin typeface="Arial"/>
+              </a:rPr>
+              <a:t>th</a:t>
+            </a:r>
+            <a:r>
+              <a:rPr b="0" lang="en-IN" sz="4400" spc="-1" strike="noStrike">
+                <a:latin typeface="Arial"/>
+              </a:rPr>
+              <a:t>e </a:t>
+            </a:r>
+            <a:r>
+              <a:rPr b="0" lang="en-IN" sz="4400" spc="-1" strike="noStrike">
+                <a:latin typeface="Arial"/>
+              </a:rPr>
+              <a:t>titl</a:t>
+            </a:r>
+            <a:r>
+              <a:rPr b="0" lang="en-IN" sz="4400" spc="-1" strike="noStrike">
+                <a:latin typeface="Arial"/>
+              </a:rPr>
+              <a:t>e </a:t>
+            </a:r>
+            <a:r>
+              <a:rPr b="0" lang="en-IN" sz="4400" spc="-1" strike="noStrike">
+                <a:latin typeface="Arial"/>
+              </a:rPr>
+              <a:t>te</a:t>
+            </a:r>
+            <a:r>
+              <a:rPr b="0" lang="en-IN" sz="4400" spc="-1" strike="noStrike">
+                <a:latin typeface="Arial"/>
+              </a:rPr>
+              <a:t>xt </a:t>
+            </a:r>
+            <a:r>
+              <a:rPr b="0" lang="en-IN" sz="4400" spc="-1" strike="noStrike">
+                <a:latin typeface="Arial"/>
+              </a:rPr>
+              <a:t>fo</a:t>
+            </a:r>
+            <a:r>
+              <a:rPr b="0" lang="en-IN" sz="4400" spc="-1" strike="noStrike">
+                <a:latin typeface="Arial"/>
+              </a:rPr>
+              <a:t>r</a:t>
+            </a:r>
+            <a:r>
+              <a:rPr b="0" lang="en-IN" sz="4400" spc="-1" strike="noStrike">
+                <a:latin typeface="Arial"/>
+              </a:rPr>
+              <a:t>m</a:t>
+            </a:r>
+            <a:r>
+              <a:rPr b="0" lang="en-IN" sz="4400" spc="-1" strike="noStrike">
+                <a:latin typeface="Arial"/>
+              </a:rPr>
+              <a:t>at</a:t>
+            </a:r>
+            <a:endParaRPr b="0" lang="en-IN" sz="4400" spc="-1" strike="noStrike">
+              <a:latin typeface="Arial"/>
+            </a:endParaRPr>
+          </a:p>
+        </p:txBody>
+      </p:sp>
+      <p:sp>
+        <p:nvSpPr>
+          <p:cNvPr id="1" name="PlaceHolder 2"/>
+          <p:cNvSpPr>
+            <a:spLocks noGrp="1"/>
+          </p:cNvSpPr>
+          <p:nvPr>
+            <p:ph type="body"/>
+          </p:nvPr>
+        </p:nvSpPr>
+        <p:spPr>
+          <a:xfrm>
+            <a:off x="609480" y="1604520"/>
+            <a:ext cx="10972440" cy="3977280"/>
+          </a:xfrm>
+          <a:prstGeom prst="rect">
+            <a:avLst/>
+          </a:prstGeom>
+        </p:spPr>
+        <p:txBody>
+          <a:bodyPr lIns="0" rIns="0" tIns="0" bIns="0">
+            <a:normAutofit/>
+          </a:bodyPr>
+          <a:p>
+            <a:pPr marL="432000" indent="-324000">
+              <a:spcBef>
+                <a:spcPts val="1417"/>
+              </a:spcBef>
+              <a:buClr>
+                <a:srgbClr val="000000"/>
+              </a:buClr>
+              <a:buSzPct val="45000"/>
+              <a:buFont typeface="Wingdings" charset="2"/>
+              <a:buChar char=""/>
+            </a:pPr>
+            <a:r>
+              <a:rPr b="0" lang="en-IN" sz="3200" spc="-1" strike="noStrike">
+                <a:latin typeface="Arial"/>
+              </a:rPr>
+              <a:t>Click to edit the outline text format</a:t>
+            </a:r>
+            <a:endParaRPr b="0" lang="en-IN" sz="3200" spc="-1" strike="noStrike">
+              <a:latin typeface="Arial"/>
+            </a:endParaRPr>
+          </a:p>
+          <a:p>
+            <a:pPr lvl="1" marL="864000" indent="-324000">
+              <a:spcBef>
+                <a:spcPts val="1134"/>
+              </a:spcBef>
+              <a:buClr>
+                <a:srgbClr val="000000"/>
+              </a:buClr>
+              <a:buSzPct val="75000"/>
+              <a:buFont typeface="Symbol" charset="2"/>
+              <a:buChar char=""/>
+            </a:pPr>
+            <a:r>
+              <a:rPr b="0" lang="en-IN" sz="2800" spc="-1" strike="noStrike">
+                <a:latin typeface="Arial"/>
+              </a:rPr>
+              <a:t>Second Outline Level</a:t>
+            </a:r>
+            <a:endParaRPr b="0" lang="en-IN" sz="2800" spc="-1" strike="noStrike">
+              <a:latin typeface="Arial"/>
+            </a:endParaRPr>
+          </a:p>
+          <a:p>
+            <a:pPr lvl="2" marL="1296000" indent="-288000">
+              <a:spcBef>
+                <a:spcPts val="850"/>
+              </a:spcBef>
+              <a:buClr>
+                <a:srgbClr val="000000"/>
+              </a:buClr>
+              <a:buSzPct val="45000"/>
+              <a:buFont typeface="Wingdings" charset="2"/>
+              <a:buChar char=""/>
+            </a:pPr>
+            <a:r>
+              <a:rPr b="0" lang="en-IN" sz="2400" spc="-1" strike="noStrike">
+                <a:latin typeface="Arial"/>
+              </a:rPr>
+              <a:t>Third Outline Level</a:t>
+            </a:r>
+            <a:endParaRPr b="0" lang="en-IN" sz="2400" spc="-1" strike="noStrike">
+              <a:latin typeface="Arial"/>
+            </a:endParaRPr>
+          </a:p>
+          <a:p>
+            <a:pPr lvl="3" marL="1728000" indent="-216000">
+              <a:spcBef>
+                <a:spcPts val="567"/>
+              </a:spcBef>
+              <a:buClr>
+                <a:srgbClr val="000000"/>
+              </a:buClr>
+              <a:buSzPct val="75000"/>
+              <a:buFont typeface="Symbol" charset="2"/>
+              <a:buChar char=""/>
+            </a:pPr>
+            <a:r>
+              <a:rPr b="0" lang="en-IN" sz="2000" spc="-1" strike="noStrike">
+                <a:latin typeface="Arial"/>
+              </a:rPr>
+              <a:t>Fourth Outline Level</a:t>
+            </a:r>
+            <a:endParaRPr b="0" lang="en-IN" sz="2000" spc="-1" strike="noStrike">
+              <a:latin typeface="Arial"/>
+            </a:endParaRPr>
+          </a:p>
+          <a:p>
+            <a:pPr lvl="4" marL="2160000" indent="-216000">
+              <a:spcBef>
+                <a:spcPts val="283"/>
+              </a:spcBef>
+              <a:buClr>
+                <a:srgbClr val="000000"/>
+              </a:buClr>
+              <a:buSzPct val="45000"/>
+              <a:buFont typeface="Wingdings" charset="2"/>
+              <a:buChar char=""/>
+            </a:pPr>
+            <a:r>
+              <a:rPr b="0" lang="en-IN" sz="2000" spc="-1" strike="noStrike">
+                <a:latin typeface="Arial"/>
+              </a:rPr>
+              <a:t>Fifth Outline Level</a:t>
+            </a:r>
+            <a:endParaRPr b="0" lang="en-IN" sz="2000" spc="-1" strike="noStrike">
+              <a:latin typeface="Arial"/>
+            </a:endParaRPr>
+          </a:p>
+          <a:p>
+            <a:pPr lvl="5" marL="2592000" indent="-216000">
+              <a:spcBef>
+                <a:spcPts val="283"/>
+              </a:spcBef>
+              <a:buClr>
+                <a:srgbClr val="000000"/>
+              </a:buClr>
+              <a:buSzPct val="45000"/>
+              <a:buFont typeface="Wingdings" charset="2"/>
+              <a:buChar char=""/>
+            </a:pPr>
+            <a:r>
+              <a:rPr b="0" lang="en-IN" sz="2000" spc="-1" strike="noStrike">
+                <a:latin typeface="Arial"/>
+              </a:rPr>
+              <a:t>Sixth Outline Level</a:t>
+            </a:r>
+            <a:endParaRPr b="0" lang="en-IN" sz="2000" spc="-1" strike="noStrike">
+              <a:latin typeface="Arial"/>
+            </a:endParaRPr>
+          </a:p>
+          <a:p>
+            <a:pPr lvl="6" marL="3024000" indent="-216000">
+              <a:spcBef>
+                <a:spcPts val="283"/>
+              </a:spcBef>
+              <a:buClr>
+                <a:srgbClr val="000000"/>
+              </a:buClr>
+              <a:buSzPct val="45000"/>
+              <a:buFont typeface="Wingdings" charset="2"/>
+              <a:buChar char=""/>
+            </a:pPr>
+            <a:r>
+              <a:rPr b="0" lang="en-IN" sz="2000" spc="-1" strike="noStrike">
+                <a:latin typeface="Arial"/>
+              </a:rPr>
+              <a:t>Seventh Outline Level</a:t>
+            </a:r>
+            <a:endParaRPr b="0" lang="en-IN" sz="2000" spc="-1" strike="noStrike">
+              <a:latin typeface="Arial"/>
+            </a:endParaRPr>
+          </a:p>
+        </p:txBody>
+      </p:sp>
+    </p:spTree>
+  </p:cSld>
+  <p:clrMap bg1="lt1" bg2="lt2" tx1="dk1" tx2="dk2" accent1="accent1" accent2="accent2" accent3="accent3" accent4="accent4" accent5="accent5" accent6="accent6" hlink="hlink" folHlink="folHlink"/>
+  <p:sldLayoutIdLst>
+    <p:sldLayoutId id="2147483649" r:id="rId2"/>
+    <p:sldLayoutId id="2147483650" r:id="rId3"/>
+    <p:sldLayoutId id="2147483651" r:id="rId4"/>
+    <p:sldLayoutId id="2147483652" r:id="rId5"/>
+    <p:sldLayoutId id="2147483653" r:id="rId6"/>
+    <p:sldLayoutId id="2147483654" r:id="rId7"/>
+    <p:sldLayoutId id="2147483655" r:id="rId8"/>
+    <p:sldLayoutId id="2147483656" r:id="rId9"/>
+    <p:sldLayoutId id="2147483657" r:id="rId10"/>
+    <p:sldLayoutId id="2147483658" r:id="rId11"/>
+    <p:sldLayoutId id="2147483659" r:id="rId12"/>
+    <p:sldLayoutId id="2147483660" r:id="rId13"/>
+  </p:sldLayoutIdLst>
+</p:sldMaster>
+</file>
+
+<file path=ppt/slideMasters/slideMaster2.xml><?xml version="1.0" encoding="utf-8"?>
+<p:sldMaster xmlns:a="http://schemas.openxmlformats.org/drawingml/2006/main" xmlns:p="http://schemas.openxmlformats.org/presentationml/2006/main" xmlns:r="http://schemas.openxmlformats.org/officeDocument/2006/relationships" xmlns:p14="http://schemas.microsoft.com/office/powerpoint/2010/main" xmlns:p15="http://schemas.microsoft.com/office/powerpoint/2012/main" xmlns:mc="http://schemas.openxmlformats.org/markup-compatibility/2006">
+  <p:cSld>
+    <p:bg>
+      <p:bgPr>
+        <a:solidFill>
+          <a:srgbClr val="ffffff"/>
+        </a:solidFill>
+      </p:bgPr>
+    </p:bg>
+    <p:spTree>
+      <p:nvGrpSpPr>
+        <p:cNvPr id="1" name=""/>
+        <p:cNvGrpSpPr/>
+        <p:nvPr/>
+      </p:nvGrpSpPr>
+      <p:grpSpPr>
+        <a:xfrm>
+          <a:off x="0" y="0"/>
+          <a:ext cx="0" cy="0"/>
+          <a:chOff x="0" y="0"/>
+          <a:chExt cx="0" cy="0"/>
+        </a:xfrm>
+      </p:grpSpPr>
+      <p:sp>
+        <p:nvSpPr>
+          <p:cNvPr id="38" name="PlaceHolder 1"/>
+          <p:cNvSpPr>
+            <a:spLocks noGrp="1"/>
+          </p:cNvSpPr>
+          <p:nvPr>
+            <p:ph type="title"/>
+          </p:nvPr>
+        </p:nvSpPr>
+        <p:spPr>
+          <a:xfrm>
             <a:off x="1523880" y="1122480"/>
-            <a:ext cx="9143280" cy="2386800"/>
+            <a:ext cx="9142920" cy="2386440"/>
           </a:xfrm>
           <a:prstGeom prst="rect">
             <a:avLst/>
@@ -2737,25 +3091,49 @@
               <a:rPr b="0" lang="en-IN" sz="1800" spc="-1" strike="noStrike">
                 <a:latin typeface="Arial"/>
               </a:rPr>
-              <a:t>Click to </a:t>
+              <a:t>Click </a:t>
             </a:r>
             <a:r>
               <a:rPr b="0" lang="en-IN" sz="1800" spc="-1" strike="noStrike">
                 <a:latin typeface="Arial"/>
               </a:rPr>
-              <a:t>edit the </a:t>
+              <a:t>to </a:t>
             </a:r>
             <a:r>
               <a:rPr b="0" lang="en-IN" sz="1800" spc="-1" strike="noStrike">
                 <a:latin typeface="Arial"/>
               </a:rPr>
-              <a:t>title text </a:t>
+              <a:t>edit </a:t>
             </a:r>
             <a:r>
               <a:rPr b="0" lang="en-IN" sz="1800" spc="-1" strike="noStrike">
                 <a:latin typeface="Arial"/>
               </a:rPr>
-              <a:t>format</a:t>
+              <a:t>the </a:t>
+            </a:r>
+            <a:r>
+              <a:rPr b="0" lang="en-IN" sz="1800" spc="-1" strike="noStrike">
+                <a:latin typeface="Arial"/>
+              </a:rPr>
+              <a:t>title </a:t>
+            </a:r>
+            <a:r>
+              <a:rPr b="0" lang="en-IN" sz="1800" spc="-1" strike="noStrike">
+                <a:latin typeface="Arial"/>
+              </a:rPr>
+              <a:t>text </a:t>
+            </a:r>
+            <a:r>
+              <a:rPr b="0" lang="en-IN" sz="1800" spc="-1" strike="noStrike">
+                <a:latin typeface="Arial"/>
+              </a:rPr>
+              <a:t>form</a:t>
+            </a:r>
+            <a:r>
+              <a:rPr b="0" lang="en-IN" sz="1800" spc="-1" strike="noStrike">
+                <a:latin typeface="Arial"/>
+              </a:rPr>
+              <a:t>at</a:t>
             </a:r>
             <a:endParaRPr b="0" lang="en-IN" sz="1800" spc="-1" strike="noStrike">
               <a:latin typeface="Arial"/>
@@ -2765,7 +3143,7 @@
       </p:sp>
       <p:sp>
         <p:nvSpPr>
-          <p:cNvPr id="1" name="PlaceHolder 2"/>
+          <p:cNvPr id="39" name="PlaceHolder 2"/>
           <p:cNvSpPr>
             <a:spLocks noGrp="1"/>
           </p:cNvSpPr>
@@ -2946,281 +3324,6 @@
   </p:cSld>
   <p:clrMap bg1="lt1" bg2="lt2" tx1="dk1" tx2="dk2" accent1="accent1" accent2="accent2" accent3="accent3" accent4="accent4" accent5="accent5" accent6="accent6" hlink="hlink" folHlink="folHlink"/>
   <p:sldLayoutIdLst>
-    <p:sldLayoutId id="2147483649" r:id="rId2"/>
-    <p:sldLayoutId id="2147483650" r:id="rId3"/>
-    <p:sldLayoutId id="2147483651" r:id="rId4"/>
-    <p:sldLayoutId id="2147483652" r:id="rId5"/>
-    <p:sldLayoutId id="2147483653" r:id="rId6"/>
-    <p:sldLayoutId id="2147483654" r:id="rId7"/>
-    <p:sldLayoutId id="2147483655" r:id="rId8"/>
-    <p:sldLayoutId id="2147483656" r:id="rId9"/>
-    <p:sldLayoutId id="2147483657" r:id="rId10"/>
-    <p:sldLayoutId id="2147483658" r:id="rId11"/>
-    <p:sldLayoutId id="2147483659" r:id="rId12"/>
-    <p:sldLayoutId id="2147483660" r:id="rId13"/>
-  </p:sldLayoutIdLst>
-</p:sldMaster>
-</file>
-
-<file path=ppt/slideMasters/slideMaster2.xml><?xml version="1.0" encoding="utf-8"?>
-<p:sldMaster xmlns:a="http://schemas.openxmlformats.org/drawingml/2006/main" xmlns:p="http://schemas.openxmlformats.org/presentationml/2006/main" xmlns:r="http://schemas.openxmlformats.org/officeDocument/2006/relationships" xmlns:p14="http://schemas.microsoft.com/office/powerpoint/2010/main" xmlns:p15="http://schemas.microsoft.com/office/powerpoint/2012/main" xmlns:mc="http://schemas.openxmlformats.org/markup-compatibility/2006">
-  <p:cSld>
-    <p:bg>
-      <p:bgPr>
-        <a:solidFill>
-          <a:srgbClr val="ffffff"/>
-        </a:solidFill>
-      </p:bgPr>
-    </p:bg>
-    <p:spTree>
-      <p:nvGrpSpPr>
-        <p:cNvPr id="1" name=""/>
-        <p:cNvGrpSpPr/>
-        <p:nvPr/>
-      </p:nvGrpSpPr>
-      <p:grpSpPr>
-        <a:xfrm>
-          <a:off x="0" y="0"/>
-          <a:ext cx="0" cy="0"/>
-          <a:chOff x="0" y="0"/>
-          <a:chExt cx="0" cy="0"/>
-        </a:xfrm>
-      </p:grpSpPr>
-      <p:sp>
-        <p:nvSpPr>
-          <p:cNvPr id="38" name="PlaceHolder 1"/>
-          <p:cNvSpPr>
-            <a:spLocks noGrp="1"/>
-          </p:cNvSpPr>
-          <p:nvPr>
-            <p:ph type="title"/>
-          </p:nvPr>
-        </p:nvSpPr>
-        <p:spPr>
-          <a:xfrm>
-            <a:off x="1523880" y="1122480"/>
-            <a:ext cx="9143280" cy="2386800"/>
-          </a:xfrm>
-          <a:prstGeom prst="rect">
-            <a:avLst/>
-          </a:prstGeom>
-        </p:spPr>
-        <p:txBody>
-          <a:bodyPr lIns="0" rIns="0" tIns="0" bIns="0" anchor="ctr"/>
-          <a:p>
-            <a:r>
-              <a:rPr b="0" lang="en-IN" sz="1800" spc="-1" strike="noStrike">
-                <a:latin typeface="Arial"/>
-              </a:rPr>
-              <a:t>Click to </a:t>
-            </a:r>
-            <a:r>
-              <a:rPr b="0" lang="en-IN" sz="1800" spc="-1" strike="noStrike">
-                <a:latin typeface="Arial"/>
-              </a:rPr>
-              <a:t>edit the </a:t>
-            </a:r>
-            <a:r>
-              <a:rPr b="0" lang="en-IN" sz="1800" spc="-1" strike="noStrike">
-                <a:latin typeface="Arial"/>
-              </a:rPr>
-              <a:t>title text </a:t>
-            </a:r>
-            <a:r>
-              <a:rPr b="0" lang="en-IN" sz="1800" spc="-1" strike="noStrike">
-                <a:latin typeface="Arial"/>
-              </a:rPr>
-              <a:t>format</a:t>
-            </a:r>
-            <a:endParaRPr b="0" lang="en-IN" sz="1800" spc="-1" strike="noStrike">
-              <a:latin typeface="Arial"/>
-            </a:endParaRPr>
-          </a:p>
-        </p:txBody>
-      </p:sp>
-      <p:sp>
-        <p:nvSpPr>
-          <p:cNvPr id="39" name="PlaceHolder 2"/>
-          <p:cNvSpPr>
-            <a:spLocks noGrp="1"/>
-          </p:cNvSpPr>
-          <p:nvPr>
-            <p:ph type="body"/>
-          </p:nvPr>
-        </p:nvSpPr>
-        <p:spPr>
-          <a:xfrm>
-            <a:off x="609480" y="1604520"/>
-            <a:ext cx="10972440" cy="3977280"/>
-          </a:xfrm>
-          <a:prstGeom prst="rect">
-            <a:avLst/>
-          </a:prstGeom>
-        </p:spPr>
-        <p:txBody>
-          <a:bodyPr lIns="0" rIns="0" tIns="0" bIns="0">
-            <a:normAutofit/>
-          </a:bodyPr>
-          <a:p>
-            <a:pPr marL="432000" indent="-324000">
-              <a:spcBef>
-                <a:spcPts val="1417"/>
-              </a:spcBef>
-              <a:buClr>
-                <a:srgbClr val="000000"/>
-              </a:buClr>
-              <a:buSzPct val="45000"/>
-              <a:buFont typeface="Wingdings" charset="2"/>
-              <a:buChar char=""/>
-            </a:pPr>
-            <a:r>
-              <a:rPr b="0" lang="en-IN" sz="3200" spc="-1" strike="noStrike">
-                <a:latin typeface="Arial"/>
-              </a:rPr>
-              <a:t>Click to edit the outline text format</a:t>
-            </a:r>
-            <a:endParaRPr b="0" lang="en-IN" sz="3200" spc="-1" strike="noStrike">
-              <a:latin typeface="Arial"/>
-            </a:endParaRPr>
-          </a:p>
-          <a:p>
-            <a:pPr lvl="1" marL="864000" indent="-324000">
-              <a:spcBef>
-                <a:spcPts val="1134"/>
-              </a:spcBef>
-              <a:buClr>
-                <a:srgbClr val="000000"/>
-              </a:buClr>
-              <a:buSzPct val="75000"/>
-              <a:buFont typeface="Symbol" charset="2"/>
-              <a:buChar char=""/>
-            </a:pPr>
-            <a:r>
-              <a:rPr b="0" lang="en-IN" sz="2800" spc="-1" strike="noStrike">
-                <a:latin typeface="Arial"/>
-              </a:rPr>
-              <a:t>Second Outline Level</a:t>
-            </a:r>
-            <a:endParaRPr b="0" lang="en-IN" sz="2800" spc="-1" strike="noStrike">
-              <a:latin typeface="Arial"/>
-            </a:endParaRPr>
-          </a:p>
-          <a:p>
-            <a:pPr lvl="2" marL="1296000" indent="-288000">
-              <a:spcBef>
-                <a:spcPts val="850"/>
-              </a:spcBef>
-              <a:buClr>
-                <a:srgbClr val="000000"/>
-              </a:buClr>
-              <a:buSzPct val="45000"/>
-              <a:buFont typeface="Wingdings" charset="2"/>
-              <a:buChar char=""/>
-            </a:pPr>
-            <a:r>
-              <a:rPr b="0" lang="en-IN" sz="2400" spc="-1" strike="noStrike">
-                <a:latin typeface="Arial"/>
-              </a:rPr>
-              <a:t>Third Outline Level</a:t>
-            </a:r>
-            <a:endParaRPr b="0" lang="en-IN" sz="2400" spc="-1" strike="noStrike">
-              <a:latin typeface="Arial"/>
-            </a:endParaRPr>
-          </a:p>
-          <a:p>
-            <a:pPr lvl="3" marL="1728000" indent="-216000">
-              <a:spcBef>
-                <a:spcPts val="567"/>
-              </a:spcBef>
-              <a:buClr>
-                <a:srgbClr val="000000"/>
-              </a:buClr>
-              <a:buSzPct val="75000"/>
-              <a:buFont typeface="Symbol" charset="2"/>
-              <a:buChar char=""/>
-            </a:pPr>
-            <a:r>
-              <a:rPr b="0" lang="en-IN" sz="2000" spc="-1" strike="noStrike">
-                <a:latin typeface="Arial"/>
-              </a:rPr>
-              <a:t>Fourth Outline Level</a:t>
-            </a:r>
-            <a:endParaRPr b="0" lang="en-IN" sz="2000" spc="-1" strike="noStrike">
-              <a:latin typeface="Arial"/>
-            </a:endParaRPr>
-          </a:p>
-          <a:p>
-            <a:pPr lvl="4" marL="2160000" indent="-216000">
-              <a:spcBef>
-                <a:spcPts val="283"/>
-              </a:spcBef>
-              <a:buClr>
-                <a:srgbClr val="000000"/>
-              </a:buClr>
-              <a:buSzPct val="45000"/>
-              <a:buFont typeface="Wingdings" charset="2"/>
-              <a:buChar char=""/>
-            </a:pPr>
-            <a:r>
-              <a:rPr b="0" lang="en-IN" sz="2000" spc="-1" strike="noStrike">
-                <a:latin typeface="Arial"/>
-              </a:rPr>
-              <a:t>Fifth Outline Level</a:t>
-            </a:r>
-            <a:endParaRPr b="0" lang="en-IN" sz="2000" spc="-1" strike="noStrike">
-              <a:latin typeface="Arial"/>
-            </a:endParaRPr>
-          </a:p>
-          <a:p>
-            <a:pPr lvl="5" marL="2592000" indent="-216000">
-              <a:spcBef>
-                <a:spcPts val="283"/>
-              </a:spcBef>
-              <a:buClr>
-                <a:srgbClr val="000000"/>
-              </a:buClr>
-              <a:buSzPct val="45000"/>
-              <a:buFont typeface="Wingdings" charset="2"/>
-              <a:buChar char=""/>
-            </a:pPr>
-            <a:r>
-              <a:rPr b="0" lang="en-IN" sz="2000" spc="-1" strike="noStrike">
-                <a:latin typeface="Arial"/>
-              </a:rPr>
-              <a:t>Sixth Outline Level</a:t>
-            </a:r>
-            <a:endParaRPr b="0" lang="en-IN" sz="2000" spc="-1" strike="noStrike">
-              <a:latin typeface="Arial"/>
-            </a:endParaRPr>
-          </a:p>
-          <a:p>
-            <a:pPr lvl="6" marL="3024000" indent="-216000">
-              <a:spcBef>
-                <a:spcPts val="283"/>
-              </a:spcBef>
-              <a:buClr>
-                <a:srgbClr val="000000"/>
-              </a:buClr>
-              <a:buSzPct val="45000"/>
-              <a:buFont typeface="Wingdings" charset="2"/>
-              <a:buChar char=""/>
-            </a:pPr>
-            <a:r>
-              <a:rPr b="0" lang="en-IN" sz="2000" spc="-1" strike="noStrike">
-                <a:latin typeface="Arial"/>
-              </a:rPr>
-              <a:t>Seventh Outline Level</a:t>
-            </a:r>
-            <a:endParaRPr b="0" lang="en-IN" sz="2000" spc="-1" strike="noStrike">
-              <a:latin typeface="Arial"/>
-            </a:endParaRPr>
-          </a:p>
-        </p:txBody>
-      </p:sp>
-    </p:spTree>
-  </p:cSld>
-  <p:clrMap bg1="lt1" bg2="lt2" tx1="dk1" tx2="dk2" accent1="accent1" accent2="accent2" accent3="accent3" accent4="accent4" accent5="accent5" accent6="accent6" hlink="hlink" folHlink="folHlink"/>
-  <p:sldLayoutIdLst>
     <p:sldLayoutId id="2147483662" r:id="rId2"/>
     <p:sldLayoutId id="2147483663" r:id="rId3"/>
     <p:sldLayoutId id="2147483664" r:id="rId4"/>
@@ -3263,7 +3366,7 @@
         <p:spPr>
           <a:xfrm>
             <a:off x="2016000" y="3816000"/>
-            <a:ext cx="8651160" cy="1871640"/>
+            <a:ext cx="8650800" cy="1871280"/>
           </a:xfrm>
           <a:prstGeom prst="rect">
             <a:avLst/>
@@ -3293,6 +3396,7 @@
                   <a:srgbClr val="000000"/>
                 </a:solidFill>
                 <a:latin typeface="Calibri"/>
+                <a:ea typeface="DejaVu Sans"/>
               </a:rPr>
               <a:t>Building GUI for Nutrigenomics Panel</a:t>
             </a:r>
@@ -3315,7 +3419,7 @@
         <p:spPr>
           <a:xfrm>
             <a:off x="3744000" y="624960"/>
-            <a:ext cx="4711680" cy="2842200"/>
+            <a:ext cx="4711320" cy="2841840"/>
           </a:xfrm>
           <a:prstGeom prst="rect">
             <a:avLst/>
@@ -3383,7 +3487,7 @@
         <p:spPr>
           <a:xfrm>
             <a:off x="118080" y="121680"/>
-            <a:ext cx="11964960" cy="6660720"/>
+            <a:ext cx="11964600" cy="6660360"/>
           </a:xfrm>
           <a:prstGeom prst="roundRect">
             <a:avLst>
@@ -3426,7 +3530,7 @@
         <p:spPr>
           <a:xfrm>
             <a:off x="629640" y="368640"/>
-            <a:ext cx="1207800" cy="716400"/>
+            <a:ext cx="1207440" cy="716040"/>
           </a:xfrm>
           <a:prstGeom prst="rect">
             <a:avLst/>
@@ -3479,7 +3583,7 @@
         <p:spPr>
           <a:xfrm>
             <a:off x="10180440" y="138600"/>
-            <a:ext cx="1724760" cy="603360"/>
+            <a:ext cx="1724400" cy="603000"/>
           </a:xfrm>
           <a:prstGeom prst="rect">
             <a:avLst/>
@@ -3590,7 +3694,7 @@
         <p:spPr>
           <a:xfrm>
             <a:off x="11062080" y="793080"/>
-            <a:ext cx="843120" cy="255240"/>
+            <a:ext cx="842760" cy="254880"/>
           </a:xfrm>
           <a:prstGeom prst="roundRect">
             <a:avLst>
@@ -3653,7 +3757,7 @@
         <p:spPr>
           <a:xfrm>
             <a:off x="509400" y="1556280"/>
-            <a:ext cx="1448280" cy="410040"/>
+            <a:ext cx="1447920" cy="409680"/>
           </a:xfrm>
           <a:prstGeom prst="roundRect">
             <a:avLst>
@@ -3715,7 +3819,7 @@
         </p:nvGraphicFramePr>
         <p:xfrm>
           <a:off x="2837520" y="1587600"/>
-          <a:ext cx="9001800" cy="761400"/>
+          <a:ext cx="9001800" cy="1019160"/>
         </p:xfrm>
         <a:graphic>
           <a:graphicData uri="http://schemas.openxmlformats.org/drawingml/2006/table">
@@ -5303,7 +5407,7 @@
         <p:spPr>
           <a:xfrm>
             <a:off x="118080" y="121680"/>
-            <a:ext cx="11964960" cy="6660720"/>
+            <a:ext cx="11964600" cy="6660360"/>
           </a:xfrm>
           <a:prstGeom prst="roundRect">
             <a:avLst>
@@ -5346,7 +5450,7 @@
         <p:spPr>
           <a:xfrm>
             <a:off x="629640" y="368640"/>
-            <a:ext cx="1207800" cy="716400"/>
+            <a:ext cx="1207440" cy="716040"/>
           </a:xfrm>
           <a:prstGeom prst="rect">
             <a:avLst/>
@@ -5399,7 +5503,7 @@
         <p:spPr>
           <a:xfrm>
             <a:off x="10180440" y="138600"/>
-            <a:ext cx="1724760" cy="603360"/>
+            <a:ext cx="1724400" cy="603000"/>
           </a:xfrm>
           <a:prstGeom prst="rect">
             <a:avLst/>
@@ -5512,7 +5616,7 @@
         <p:spPr>
           <a:xfrm>
             <a:off x="11062080" y="793080"/>
-            <a:ext cx="843120" cy="255240"/>
+            <a:ext cx="842760" cy="254880"/>
           </a:xfrm>
           <a:prstGeom prst="roundRect">
             <a:avLst>
@@ -5575,7 +5679,7 @@
         <p:spPr>
           <a:xfrm>
             <a:off x="509400" y="1556280"/>
-            <a:ext cx="1448280" cy="410040"/>
+            <a:ext cx="1447920" cy="409680"/>
           </a:xfrm>
           <a:prstGeom prst="roundRect">
             <a:avLst>
@@ -5638,7 +5742,7 @@
         <p:spPr>
           <a:xfrm>
             <a:off x="542520" y="2098800"/>
-            <a:ext cx="1448280" cy="410040"/>
+            <a:ext cx="1447920" cy="409680"/>
           </a:xfrm>
           <a:prstGeom prst="roundRect">
             <a:avLst>
@@ -5701,7 +5805,7 @@
         <p:spPr>
           <a:xfrm>
             <a:off x="2793240" y="1377000"/>
-            <a:ext cx="8912880" cy="5041800"/>
+            <a:ext cx="8912520" cy="5041440"/>
           </a:xfrm>
           <a:prstGeom prst="roundRect">
             <a:avLst>
@@ -5742,7 +5846,7 @@
         <p:spPr>
           <a:xfrm>
             <a:off x="2926800" y="1446120"/>
-            <a:ext cx="2751840" cy="272520"/>
+            <a:ext cx="2751480" cy="272160"/>
           </a:xfrm>
           <a:prstGeom prst="rect">
             <a:avLst/>
@@ -5791,7 +5895,7 @@
         <p:spPr>
           <a:xfrm>
             <a:off x="3004200" y="1828440"/>
-            <a:ext cx="1769040" cy="272520"/>
+            <a:ext cx="1768680" cy="272160"/>
           </a:xfrm>
           <a:prstGeom prst="rect">
             <a:avLst/>
@@ -5840,7 +5944,7 @@
         <p:spPr>
           <a:xfrm>
             <a:off x="3004200" y="2535840"/>
-            <a:ext cx="1769040" cy="272520"/>
+            <a:ext cx="1768680" cy="272160"/>
           </a:xfrm>
           <a:prstGeom prst="rect">
             <a:avLst/>
@@ -5889,7 +5993,7 @@
         <p:spPr>
           <a:xfrm>
             <a:off x="3004200" y="2197800"/>
-            <a:ext cx="1769040" cy="272520"/>
+            <a:ext cx="1768680" cy="272160"/>
           </a:xfrm>
           <a:prstGeom prst="rect">
             <a:avLst/>
@@ -5938,7 +6042,7 @@
         <p:spPr>
           <a:xfrm>
             <a:off x="3424320" y="2902320"/>
-            <a:ext cx="1460880" cy="272520"/>
+            <a:ext cx="1460520" cy="272160"/>
           </a:xfrm>
           <a:prstGeom prst="rect">
             <a:avLst/>
@@ -5987,7 +6091,7 @@
         <p:spPr>
           <a:xfrm>
             <a:off x="3004200" y="3274560"/>
-            <a:ext cx="1769040" cy="272520"/>
+            <a:ext cx="1768680" cy="272160"/>
           </a:xfrm>
           <a:prstGeom prst="rect">
             <a:avLst/>
@@ -6036,7 +6140,7 @@
         <p:spPr>
           <a:xfrm>
             <a:off x="3004200" y="3650040"/>
-            <a:ext cx="1769040" cy="272520"/>
+            <a:ext cx="1768680" cy="272160"/>
           </a:xfrm>
           <a:prstGeom prst="rect">
             <a:avLst/>
@@ -6085,7 +6189,7 @@
         <p:spPr>
           <a:xfrm>
             <a:off x="4935600" y="1828440"/>
-            <a:ext cx="1769040" cy="272520"/>
+            <a:ext cx="1768680" cy="272160"/>
           </a:xfrm>
           <a:prstGeom prst="rect">
             <a:avLst/>
@@ -6138,7 +6242,7 @@
         <p:spPr>
           <a:xfrm>
             <a:off x="4935600" y="2535840"/>
-            <a:ext cx="1769040" cy="276120"/>
+            <a:ext cx="1768680" cy="275760"/>
           </a:xfrm>
           <a:prstGeom prst="rect">
             <a:avLst/>
@@ -6168,7 +6272,7 @@
         <p:spPr>
           <a:xfrm>
             <a:off x="4935600" y="2197800"/>
-            <a:ext cx="1769040" cy="276120"/>
+            <a:ext cx="1768680" cy="275760"/>
           </a:xfrm>
           <a:prstGeom prst="rect">
             <a:avLst/>
@@ -6198,7 +6302,7 @@
         <p:spPr>
           <a:xfrm>
             <a:off x="4935600" y="2902320"/>
-            <a:ext cx="1769040" cy="276120"/>
+            <a:ext cx="1768680" cy="275760"/>
           </a:xfrm>
           <a:prstGeom prst="rect">
             <a:avLst/>
@@ -6228,7 +6332,7 @@
         <p:spPr>
           <a:xfrm>
             <a:off x="4935600" y="3274560"/>
-            <a:ext cx="1769040" cy="276120"/>
+            <a:ext cx="1768680" cy="275760"/>
           </a:xfrm>
           <a:prstGeom prst="rect">
             <a:avLst/>
@@ -6258,7 +6362,7 @@
         <p:spPr>
           <a:xfrm>
             <a:off x="4935600" y="3650040"/>
-            <a:ext cx="1769040" cy="276120"/>
+            <a:ext cx="1768680" cy="275760"/>
           </a:xfrm>
           <a:prstGeom prst="rect">
             <a:avLst/>
@@ -6288,7 +6392,7 @@
         <p:spPr>
           <a:xfrm>
             <a:off x="5778360" y="1828440"/>
-            <a:ext cx="924120" cy="282240"/>
+            <a:ext cx="923760" cy="281880"/>
           </a:xfrm>
           <a:prstGeom prst="rect">
             <a:avLst/>
@@ -6341,7 +6445,7 @@
         <p:spPr>
           <a:xfrm>
             <a:off x="3004200" y="4003200"/>
-            <a:ext cx="1769040" cy="272520"/>
+            <a:ext cx="1768680" cy="272160"/>
           </a:xfrm>
           <a:prstGeom prst="rect">
             <a:avLst/>
@@ -6390,7 +6494,7 @@
         <p:spPr>
           <a:xfrm>
             <a:off x="4941360" y="4028400"/>
-            <a:ext cx="1725480" cy="316440"/>
+            <a:ext cx="1725120" cy="316080"/>
           </a:xfrm>
           <a:prstGeom prst="rect">
             <a:avLst/>
@@ -6454,7 +6558,7 @@
         <p:spPr>
           <a:xfrm>
             <a:off x="6410520" y="4104360"/>
-            <a:ext cx="166680" cy="155520"/>
+            <a:ext cx="166320" cy="155160"/>
           </a:xfrm>
           <a:prstGeom prst="flowChartMerge">
             <a:avLst/>
@@ -6492,7 +6596,7 @@
         <p:spPr>
           <a:xfrm>
             <a:off x="6353640" y="4023720"/>
-            <a:ext cx="313200" cy="316440"/>
+            <a:ext cx="312840" cy="316080"/>
           </a:xfrm>
           <a:prstGeom prst="rect">
             <a:avLst/>
@@ -6531,7 +6635,7 @@
         <p:spPr>
           <a:xfrm>
             <a:off x="10180440" y="5645160"/>
-            <a:ext cx="964440" cy="275040"/>
+            <a:ext cx="964080" cy="274680"/>
           </a:xfrm>
           <a:prstGeom prst="roundRect">
             <a:avLst>
@@ -6647,7 +6751,7 @@
         <p:spPr>
           <a:xfrm>
             <a:off x="3672000" y="432000"/>
-            <a:ext cx="4967640" cy="791640"/>
+            <a:ext cx="4967280" cy="791280"/>
           </a:xfrm>
           <a:prstGeom prst="rect">
             <a:avLst/>
@@ -6677,6 +6781,7 @@
                   <a:srgbClr val="000000"/>
                 </a:solidFill>
                 <a:latin typeface="Calibri"/>
+                <a:ea typeface="DejaVu Sans"/>
               </a:rPr>
               <a:t>Project Requirements</a:t>
             </a:r>
@@ -6695,7 +6800,7 @@
         <p:spPr>
           <a:xfrm>
             <a:off x="609480" y="1604520"/>
-            <a:ext cx="10972080" cy="4515120"/>
+            <a:ext cx="10971720" cy="4514760"/>
           </a:xfrm>
           <a:prstGeom prst="rect">
             <a:avLst/>
@@ -6716,7 +6821,7 @@
             <a:normAutofit/>
           </a:bodyPr>
           <a:p>
-            <a:pPr marL="432000" indent="-323640">
+            <a:pPr marL="432000" indent="-323280">
               <a:lnSpc>
                 <a:spcPct val="100000"/>
               </a:lnSpc>
@@ -6736,6 +6841,7 @@
                   <a:srgbClr val="000000"/>
                 </a:solidFill>
                 <a:latin typeface="Calibri"/>
+                <a:ea typeface="DejaVu Sans"/>
               </a:rPr>
               <a:t>A web-based user interface or a tool which can take patients details, processing all necessary input files, necessary scripts/programs to perform analysis, processing the results, generating the reports in pdf and displaying the same in a web page, and overall management of patient details and testing.</a:t>
             </a:r>
@@ -6744,7 +6850,7 @@
             </a:endParaRPr>
           </a:p>
           <a:p>
-            <a:pPr marL="432000" indent="-323640">
+            <a:pPr marL="432000" indent="-323280">
               <a:lnSpc>
                 <a:spcPct val="100000"/>
               </a:lnSpc>
@@ -6764,6 +6870,7 @@
                   <a:srgbClr val="000000"/>
                 </a:solidFill>
                 <a:latin typeface="Calibri"/>
+                <a:ea typeface="DejaVu Sans"/>
               </a:rPr>
               <a:t>Patients, 23&amp;me, blood and allergy results will be provided by client in pdf/word/text/excel/API format and will be used as input to generate report.</a:t>
             </a:r>
@@ -6772,7 +6879,7 @@
             </a:endParaRPr>
           </a:p>
           <a:p>
-            <a:pPr marL="432000" indent="-323640">
+            <a:pPr marL="432000" indent="-323280">
               <a:lnSpc>
                 <a:spcPct val="100000"/>
               </a:lnSpc>
@@ -6792,6 +6899,7 @@
                   <a:srgbClr val="000000"/>
                 </a:solidFill>
                 <a:latin typeface="Calibri"/>
+                <a:ea typeface="DejaVu Sans"/>
               </a:rPr>
               <a:t>The necessary data in csv format will be provided by the client for creating the database and necessary process of taking input file, analysis, and generating results will be done by contractor.</a:t>
             </a:r>
@@ -6800,7 +6908,7 @@
             </a:endParaRPr>
           </a:p>
           <a:p>
-            <a:pPr marL="432000" indent="-323640">
+            <a:pPr marL="432000" indent="-323280">
               <a:lnSpc>
                 <a:spcPct val="100000"/>
               </a:lnSpc>
@@ -6820,6 +6928,7 @@
                   <a:srgbClr val="000000"/>
                 </a:solidFill>
                 <a:latin typeface="Calibri"/>
+                <a:ea typeface="DejaVu Sans"/>
               </a:rPr>
               <a:t>The end deliverable of this service will be a tool/website where the client can input the genetic, blood test, and allergy test data and get the recommended diet and exercise plan report.</a:t>
             </a:r>
@@ -6828,7 +6937,7 @@
             </a:endParaRPr>
           </a:p>
           <a:p>
-            <a:pPr marL="432000" indent="-323640">
+            <a:pPr marL="432000" indent="-323280">
               <a:lnSpc>
                 <a:spcPct val="100000"/>
               </a:lnSpc>
@@ -6848,6 +6957,7 @@
                   <a:srgbClr val="000000"/>
                 </a:solidFill>
                 <a:latin typeface="Calibri"/>
+                <a:ea typeface="DejaVu Sans"/>
               </a:rPr>
               <a:t>The complete module will be delivered by end of Feb 2021 and we will try to submit  </a:t>
             </a:r>
@@ -6915,7 +7025,7 @@
         <p:spPr>
           <a:xfrm>
             <a:off x="1512000" y="360000"/>
-            <a:ext cx="9143280" cy="791640"/>
+            <a:ext cx="9142920" cy="791280"/>
           </a:xfrm>
           <a:prstGeom prst="rect">
             <a:avLst/>
@@ -6945,6 +7055,7 @@
                   <a:srgbClr val="000000"/>
                 </a:solidFill>
                 <a:latin typeface="Calibri"/>
+                <a:ea typeface="DejaVu Sans"/>
               </a:rPr>
               <a:t>Technical Requirements</a:t>
             </a:r>
@@ -6963,7 +7074,7 @@
         <p:spPr>
           <a:xfrm>
             <a:off x="609480" y="1604520"/>
-            <a:ext cx="10972080" cy="3976920"/>
+            <a:ext cx="10971720" cy="3976560"/>
           </a:xfrm>
           <a:prstGeom prst="rect">
             <a:avLst/>
@@ -6984,7 +7095,7 @@
             <a:normAutofit/>
           </a:bodyPr>
           <a:p>
-            <a:pPr marL="432000" indent="-323640">
+            <a:pPr marL="432000" indent="-323280">
               <a:lnSpc>
                 <a:spcPct val="100000"/>
               </a:lnSpc>
@@ -7004,6 +7115,7 @@
                   <a:srgbClr val="000000"/>
                 </a:solidFill>
                 <a:latin typeface="Calibri"/>
+                <a:ea typeface="DejaVu Sans"/>
               </a:rPr>
               <a:t>GUI of project will be developed in html, css , bootstarp and javascript</a:t>
             </a:r>
@@ -7012,7 +7124,7 @@
             </a:endParaRPr>
           </a:p>
           <a:p>
-            <a:pPr lvl="1" marL="864000" indent="-323640">
+            <a:pPr lvl="1" marL="864000" indent="-323280">
               <a:lnSpc>
                 <a:spcPct val="100000"/>
               </a:lnSpc>
@@ -7032,6 +7144,7 @@
                   <a:srgbClr val="000000"/>
                 </a:solidFill>
                 <a:latin typeface="Calibri"/>
+                <a:ea typeface="DejaVu Sans"/>
               </a:rPr>
               <a:t>HTML, CSS is used for basic Web Pages development.</a:t>
             </a:r>
@@ -7040,7 +7153,7 @@
             </a:endParaRPr>
           </a:p>
           <a:p>
-            <a:pPr lvl="1" marL="864000" indent="-323640">
+            <a:pPr lvl="1" marL="864000" indent="-323280">
               <a:lnSpc>
                 <a:spcPct val="100000"/>
               </a:lnSpc>
@@ -7060,6 +7173,7 @@
                   <a:srgbClr val="000000"/>
                 </a:solidFill>
                 <a:latin typeface="Calibri"/>
+                <a:ea typeface="DejaVu Sans"/>
               </a:rPr>
               <a:t>Bootstarp is used for responsiveness of page  in any size of device.</a:t>
             </a:r>
@@ -7068,7 +7182,7 @@
             </a:endParaRPr>
           </a:p>
           <a:p>
-            <a:pPr lvl="1" marL="864000" indent="-323640">
+            <a:pPr lvl="1" marL="864000" indent="-323280">
               <a:lnSpc>
                 <a:spcPct val="100000"/>
               </a:lnSpc>
@@ -7088,6 +7202,7 @@
                   <a:srgbClr val="000000"/>
                 </a:solidFill>
                 <a:latin typeface="Calibri"/>
+                <a:ea typeface="DejaVu Sans"/>
               </a:rPr>
               <a:t>Javascript is used for client side validation.</a:t>
             </a:r>
@@ -7096,7 +7211,7 @@
             </a:endParaRPr>
           </a:p>
           <a:p>
-            <a:pPr marL="432000" indent="-323640">
+            <a:pPr marL="432000" indent="-323280">
               <a:lnSpc>
                 <a:spcPct val="100000"/>
               </a:lnSpc>
@@ -7116,6 +7231,7 @@
                   <a:srgbClr val="000000"/>
                 </a:solidFill>
                 <a:latin typeface="Calibri"/>
+                <a:ea typeface="DejaVu Sans"/>
               </a:rPr>
               <a:t>For server side scripting as well as database connection python flask framework will be used.</a:t>
             </a:r>
@@ -7124,7 +7240,7 @@
             </a:endParaRPr>
           </a:p>
           <a:p>
-            <a:pPr lvl="1" marL="864000" indent="-323640">
+            <a:pPr lvl="1" marL="864000" indent="-323280">
               <a:lnSpc>
                 <a:spcPct val="100000"/>
               </a:lnSpc>
@@ -7144,6 +7260,7 @@
                   <a:srgbClr val="000000"/>
                 </a:solidFill>
                 <a:latin typeface="Calibri"/>
+                <a:ea typeface="DejaVu Sans"/>
               </a:rPr>
               <a:t>Any server side scripting language will work as middle ware between GUI and database where all data is stored</a:t>
             </a:r>
@@ -7152,7 +7269,7 @@
             </a:endParaRPr>
           </a:p>
           <a:p>
-            <a:pPr marL="432000" indent="-323640">
+            <a:pPr marL="432000" indent="-323280">
               <a:lnSpc>
                 <a:spcPct val="100000"/>
               </a:lnSpc>
@@ -7172,6 +7289,7 @@
                   <a:srgbClr val="000000"/>
                 </a:solidFill>
                 <a:latin typeface="Calibri"/>
+                <a:ea typeface="DejaVu Sans"/>
               </a:rPr>
               <a:t>MySQL / PostgreSQL database will be used for storing all data which is coming from user side</a:t>
             </a:r>
@@ -7278,7 +7396,7 @@
         <p:spPr>
           <a:xfrm>
             <a:off x="1512000" y="360000"/>
-            <a:ext cx="9143280" cy="791640"/>
+            <a:ext cx="9142920" cy="791280"/>
           </a:xfrm>
           <a:prstGeom prst="rect">
             <a:avLst/>
@@ -7308,6 +7426,7 @@
                   <a:srgbClr val="000000"/>
                 </a:solidFill>
                 <a:latin typeface="Calibri"/>
+                <a:ea typeface="DejaVu Sans"/>
               </a:rPr>
               <a:t>Deployment</a:t>
             </a:r>
@@ -7326,7 +7445,7 @@
         <p:spPr>
           <a:xfrm>
             <a:off x="609480" y="1604520"/>
-            <a:ext cx="10972080" cy="3976920"/>
+            <a:ext cx="10971720" cy="3976560"/>
           </a:xfrm>
           <a:prstGeom prst="rect">
             <a:avLst/>
@@ -7347,7 +7466,7 @@
             <a:normAutofit/>
           </a:bodyPr>
           <a:p>
-            <a:pPr marL="432000" indent="-323640">
+            <a:pPr marL="432000" indent="-323280">
               <a:lnSpc>
                 <a:spcPct val="100000"/>
               </a:lnSpc>
@@ -7367,6 +7486,7 @@
                   <a:srgbClr val="000000"/>
                 </a:solidFill>
                 <a:latin typeface="Calibri"/>
+                <a:ea typeface="DejaVu Sans"/>
               </a:rPr>
               <a:t>All deployment will be done on Amazon Cloud.</a:t>
             </a:r>
@@ -7375,7 +7495,7 @@
             </a:endParaRPr>
           </a:p>
           <a:p>
-            <a:pPr marL="432000" indent="-323640">
+            <a:pPr marL="432000" indent="-323280">
               <a:lnSpc>
                 <a:spcPct val="100000"/>
               </a:lnSpc>
@@ -7395,6 +7515,7 @@
                   <a:srgbClr val="000000"/>
                 </a:solidFill>
                 <a:latin typeface="Calibri"/>
+                <a:ea typeface="DejaVu Sans"/>
               </a:rPr>
               <a:t>Currently we will be using our Amazon account and local server for development phase of project.</a:t>
             </a:r>
@@ -7403,7 +7524,7 @@
             </a:endParaRPr>
           </a:p>
           <a:p>
-            <a:pPr marL="432000" indent="-323640">
+            <a:pPr marL="432000" indent="-323280">
               <a:lnSpc>
                 <a:spcPct val="100000"/>
               </a:lnSpc>
@@ -7423,6 +7544,7 @@
                   <a:srgbClr val="000000"/>
                 </a:solidFill>
                 <a:latin typeface="Calibri"/>
+                <a:ea typeface="DejaVu Sans"/>
               </a:rPr>
               <a:t>Later after project completion, all deployment of project will be done on your provided Amazon cloud account.</a:t>
             </a:r>
@@ -7490,7 +7612,7 @@
         <p:spPr>
           <a:xfrm>
             <a:off x="118080" y="121680"/>
-            <a:ext cx="11964960" cy="6660720"/>
+            <a:ext cx="11964600" cy="6660360"/>
           </a:xfrm>
           <a:prstGeom prst="roundRect">
             <a:avLst>
@@ -7529,7 +7651,7 @@
         <p:spPr>
           <a:xfrm>
             <a:off x="5029200" y="2864520"/>
-            <a:ext cx="1725480" cy="316440"/>
+            <a:ext cx="1725120" cy="316080"/>
           </a:xfrm>
           <a:prstGeom prst="rect">
             <a:avLst/>
@@ -7570,7 +7692,7 @@
         <p:spPr>
           <a:xfrm>
             <a:off x="4084200" y="2864520"/>
-            <a:ext cx="844560" cy="316440"/>
+            <a:ext cx="844200" cy="316080"/>
           </a:xfrm>
           <a:prstGeom prst="rect">
             <a:avLst/>
@@ -7627,7 +7749,7 @@
         <p:spPr>
           <a:xfrm>
             <a:off x="4084200" y="3270240"/>
-            <a:ext cx="844560" cy="316440"/>
+            <a:ext cx="844200" cy="316080"/>
           </a:xfrm>
           <a:prstGeom prst="rect">
             <a:avLst/>
@@ -7684,7 +7806,7 @@
         <p:spPr>
           <a:xfrm>
             <a:off x="5029200" y="3274920"/>
-            <a:ext cx="1725480" cy="316440"/>
+            <a:ext cx="1725120" cy="316080"/>
           </a:xfrm>
           <a:prstGeom prst="rect">
             <a:avLst/>
@@ -7748,7 +7870,7 @@
         <p:spPr>
           <a:xfrm>
             <a:off x="6498360" y="3350880"/>
-            <a:ext cx="166680" cy="155520"/>
+            <a:ext cx="166320" cy="155160"/>
           </a:xfrm>
           <a:prstGeom prst="flowChartMerge">
             <a:avLst/>
@@ -7781,7 +7903,7 @@
         <p:spPr>
           <a:xfrm>
             <a:off x="4084200" y="3642120"/>
-            <a:ext cx="844560" cy="316440"/>
+            <a:ext cx="844200" cy="316080"/>
           </a:xfrm>
           <a:prstGeom prst="rect">
             <a:avLst/>
@@ -7838,7 +7960,7 @@
         <p:spPr>
           <a:xfrm>
             <a:off x="5029200" y="3646800"/>
-            <a:ext cx="1725480" cy="316440"/>
+            <a:ext cx="1725120" cy="316080"/>
           </a:xfrm>
           <a:prstGeom prst="rect">
             <a:avLst/>
@@ -7883,7 +8005,7 @@
         <p:spPr>
           <a:xfrm>
             <a:off x="629640" y="368640"/>
-            <a:ext cx="1207800" cy="716400"/>
+            <a:ext cx="1207440" cy="716040"/>
           </a:xfrm>
           <a:prstGeom prst="rect">
             <a:avLst/>
@@ -7902,7 +8024,7 @@
         <p:spPr>
           <a:xfrm>
             <a:off x="3271680" y="2194560"/>
-            <a:ext cx="4865760" cy="2315880"/>
+            <a:ext cx="4865400" cy="2315520"/>
           </a:xfrm>
           <a:prstGeom prst="roundRect">
             <a:avLst>
@@ -7943,7 +8065,7 @@
         <p:spPr>
           <a:xfrm>
             <a:off x="3454560" y="2009880"/>
-            <a:ext cx="1725480" cy="637920"/>
+            <a:ext cx="1725120" cy="637560"/>
           </a:xfrm>
           <a:prstGeom prst="rect">
             <a:avLst/>
@@ -7994,7 +8116,7 @@
         <p:spPr>
           <a:xfrm>
             <a:off x="6997320" y="4060080"/>
-            <a:ext cx="860040" cy="317880"/>
+            <a:ext cx="859680" cy="317520"/>
           </a:xfrm>
           <a:prstGeom prst="roundRect">
             <a:avLst>
@@ -8057,7 +8179,7 @@
         <p:spPr>
           <a:xfrm>
             <a:off x="3646440" y="4060080"/>
-            <a:ext cx="860040" cy="317880"/>
+            <a:ext cx="859680" cy="317520"/>
           </a:xfrm>
           <a:prstGeom prst="roundRect">
             <a:avLst>
@@ -8120,7 +8242,7 @@
         <p:spPr>
           <a:xfrm>
             <a:off x="6441480" y="3270240"/>
-            <a:ext cx="313200" cy="316440"/>
+            <a:ext cx="312840" cy="316080"/>
           </a:xfrm>
           <a:prstGeom prst="rect">
             <a:avLst/>
@@ -8208,7 +8330,7 @@
         <p:spPr>
           <a:xfrm>
             <a:off x="118080" y="121680"/>
-            <a:ext cx="11964960" cy="6660720"/>
+            <a:ext cx="11964600" cy="6660360"/>
           </a:xfrm>
           <a:prstGeom prst="roundRect">
             <a:avLst>
@@ -8251,7 +8373,7 @@
         <p:spPr>
           <a:xfrm>
             <a:off x="629640" y="368640"/>
-            <a:ext cx="1207800" cy="716400"/>
+            <a:ext cx="1207440" cy="716040"/>
           </a:xfrm>
           <a:prstGeom prst="rect">
             <a:avLst/>
@@ -8304,7 +8426,7 @@
         <p:spPr>
           <a:xfrm>
             <a:off x="10180440" y="138600"/>
-            <a:ext cx="1724760" cy="603360"/>
+            <a:ext cx="1724400" cy="603000"/>
           </a:xfrm>
           <a:prstGeom prst="rect">
             <a:avLst/>
@@ -8415,7 +8537,7 @@
         <p:spPr>
           <a:xfrm>
             <a:off x="2394720" y="2003400"/>
-            <a:ext cx="1769040" cy="272520"/>
+            <a:ext cx="1768680" cy="272160"/>
           </a:xfrm>
           <a:prstGeom prst="rect">
             <a:avLst/>
@@ -8464,7 +8586,7 @@
         <p:spPr>
           <a:xfrm>
             <a:off x="2793240" y="1377000"/>
-            <a:ext cx="8912880" cy="5041800"/>
+            <a:ext cx="8912520" cy="5041440"/>
           </a:xfrm>
           <a:prstGeom prst="roundRect">
             <a:avLst>
@@ -8503,7 +8625,7 @@
         <p:spPr>
           <a:xfrm>
             <a:off x="4326120" y="2003400"/>
-            <a:ext cx="1769040" cy="454320"/>
+            <a:ext cx="1768680" cy="453960"/>
           </a:xfrm>
           <a:prstGeom prst="rect">
             <a:avLst/>
@@ -8554,7 +8676,7 @@
         <p:spPr>
           <a:xfrm>
             <a:off x="2394720" y="2375640"/>
-            <a:ext cx="1769040" cy="272520"/>
+            <a:ext cx="1768680" cy="272160"/>
           </a:xfrm>
           <a:prstGeom prst="rect">
             <a:avLst/>
@@ -8603,7 +8725,7 @@
         <p:spPr>
           <a:xfrm>
             <a:off x="2394720" y="3483360"/>
-            <a:ext cx="1769040" cy="272520"/>
+            <a:ext cx="1768680" cy="272160"/>
           </a:xfrm>
           <a:prstGeom prst="rect">
             <a:avLst/>
@@ -8652,7 +8774,7 @@
         <p:spPr>
           <a:xfrm>
             <a:off x="2394720" y="2745000"/>
-            <a:ext cx="1769040" cy="272520"/>
+            <a:ext cx="1768680" cy="272160"/>
           </a:xfrm>
           <a:prstGeom prst="rect">
             <a:avLst/>
@@ -8701,7 +8823,7 @@
         <p:spPr>
           <a:xfrm>
             <a:off x="2369520" y="5485320"/>
-            <a:ext cx="1928520" cy="368640"/>
+            <a:ext cx="1928160" cy="368280"/>
           </a:xfrm>
           <a:prstGeom prst="rect">
             <a:avLst/>
@@ -8750,7 +8872,7 @@
         <p:spPr>
           <a:xfrm>
             <a:off x="2369520" y="5739480"/>
-            <a:ext cx="1928520" cy="399240"/>
+            <a:ext cx="1928160" cy="398880"/>
           </a:xfrm>
           <a:prstGeom prst="rect">
             <a:avLst/>
@@ -8809,7 +8931,7 @@
         <p:spPr>
           <a:xfrm>
             <a:off x="2369520" y="5198760"/>
-            <a:ext cx="1928520" cy="399240"/>
+            <a:ext cx="1928160" cy="398880"/>
           </a:xfrm>
           <a:prstGeom prst="rect">
             <a:avLst/>
@@ -8868,7 +8990,7 @@
         <p:spPr>
           <a:xfrm>
             <a:off x="2369520" y="6027840"/>
-            <a:ext cx="1928520" cy="368640"/>
+            <a:ext cx="1928160" cy="368280"/>
           </a:xfrm>
           <a:prstGeom prst="rect">
             <a:avLst/>
@@ -8917,7 +9039,7 @@
         <p:spPr>
           <a:xfrm>
             <a:off x="2394720" y="3114000"/>
-            <a:ext cx="1769040" cy="272520"/>
+            <a:ext cx="1768680" cy="272160"/>
           </a:xfrm>
           <a:prstGeom prst="rect">
             <a:avLst/>
@@ -8966,7 +9088,7 @@
         <p:spPr>
           <a:xfrm>
             <a:off x="2814840" y="3849840"/>
-            <a:ext cx="1460880" cy="272520"/>
+            <a:ext cx="1460520" cy="272160"/>
           </a:xfrm>
           <a:prstGeom prst="rect">
             <a:avLst/>
@@ -9015,7 +9137,7 @@
         <p:spPr>
           <a:xfrm>
             <a:off x="2394720" y="4222080"/>
-            <a:ext cx="1769040" cy="272520"/>
+            <a:ext cx="1768680" cy="272160"/>
           </a:xfrm>
           <a:prstGeom prst="rect">
             <a:avLst/>
@@ -9064,7 +9186,7 @@
         <p:spPr>
           <a:xfrm>
             <a:off x="2394720" y="4597560"/>
-            <a:ext cx="1769040" cy="272520"/>
+            <a:ext cx="1768680" cy="272160"/>
           </a:xfrm>
           <a:prstGeom prst="rect">
             <a:avLst/>
@@ -9113,7 +9235,7 @@
         <p:spPr>
           <a:xfrm>
             <a:off x="2926800" y="1446120"/>
-            <a:ext cx="2751840" cy="272520"/>
+            <a:ext cx="2751480" cy="272160"/>
           </a:xfrm>
           <a:prstGeom prst="rect">
             <a:avLst/>
@@ -9162,7 +9284,7 @@
         <p:spPr>
           <a:xfrm>
             <a:off x="2926800" y="4880520"/>
-            <a:ext cx="2205720" cy="272520"/>
+            <a:ext cx="2205360" cy="272160"/>
           </a:xfrm>
           <a:prstGeom prst="rect">
             <a:avLst/>
@@ -9211,7 +9333,7 @@
         <p:spPr>
           <a:xfrm>
             <a:off x="4326120" y="2375640"/>
-            <a:ext cx="1769040" cy="272520"/>
+            <a:ext cx="1768680" cy="272160"/>
           </a:xfrm>
           <a:prstGeom prst="rect">
             <a:avLst/>
@@ -9262,7 +9384,7 @@
         <p:spPr>
           <a:xfrm>
             <a:off x="4326120" y="3483360"/>
-            <a:ext cx="1769040" cy="276120"/>
+            <a:ext cx="1768680" cy="275760"/>
           </a:xfrm>
           <a:prstGeom prst="rect">
             <a:avLst/>
@@ -9290,7 +9412,7 @@
         <p:spPr>
           <a:xfrm>
             <a:off x="4326120" y="2745000"/>
-            <a:ext cx="1769040" cy="276120"/>
+            <a:ext cx="1768680" cy="275760"/>
           </a:xfrm>
           <a:prstGeom prst="rect">
             <a:avLst/>
@@ -9318,7 +9440,7 @@
         <p:spPr>
           <a:xfrm>
             <a:off x="4326120" y="3114000"/>
-            <a:ext cx="1769040" cy="276120"/>
+            <a:ext cx="1768680" cy="275760"/>
           </a:xfrm>
           <a:prstGeom prst="rect">
             <a:avLst/>
@@ -9346,7 +9468,7 @@
         <p:spPr>
           <a:xfrm>
             <a:off x="4326120" y="3849840"/>
-            <a:ext cx="1769040" cy="276120"/>
+            <a:ext cx="1768680" cy="275760"/>
           </a:xfrm>
           <a:prstGeom prst="rect">
             <a:avLst/>
@@ -9374,7 +9496,7 @@
         <p:spPr>
           <a:xfrm>
             <a:off x="4326120" y="4222080"/>
-            <a:ext cx="1769040" cy="276120"/>
+            <a:ext cx="1768680" cy="275760"/>
           </a:xfrm>
           <a:prstGeom prst="rect">
             <a:avLst/>
@@ -9402,7 +9524,7 @@
         <p:spPr>
           <a:xfrm>
             <a:off x="4326120" y="4597560"/>
-            <a:ext cx="1769040" cy="276120"/>
+            <a:ext cx="1768680" cy="275760"/>
           </a:xfrm>
           <a:prstGeom prst="rect">
             <a:avLst/>
@@ -9430,7 +9552,7 @@
         <p:spPr>
           <a:xfrm>
             <a:off x="4349520" y="5485320"/>
-            <a:ext cx="1769040" cy="254880"/>
+            <a:ext cx="1768680" cy="254520"/>
           </a:xfrm>
           <a:prstGeom prst="rect">
             <a:avLst/>
@@ -9458,7 +9580,7 @@
         <p:spPr>
           <a:xfrm>
             <a:off x="4349520" y="5739480"/>
-            <a:ext cx="1769040" cy="276120"/>
+            <a:ext cx="1768680" cy="275760"/>
           </a:xfrm>
           <a:prstGeom prst="rect">
             <a:avLst/>
@@ -9486,7 +9608,7 @@
         <p:spPr>
           <a:xfrm>
             <a:off x="4349520" y="5198760"/>
-            <a:ext cx="1769040" cy="276120"/>
+            <a:ext cx="1768680" cy="275760"/>
           </a:xfrm>
           <a:prstGeom prst="rect">
             <a:avLst/>
@@ -9514,7 +9636,7 @@
         <p:spPr>
           <a:xfrm>
             <a:off x="4349520" y="6027840"/>
-            <a:ext cx="1769040" cy="254880"/>
+            <a:ext cx="1768680" cy="254520"/>
           </a:xfrm>
           <a:prstGeom prst="rect">
             <a:avLst/>
@@ -9541,7 +9663,7 @@
         </p:nvSpPr>
         <p:spPr>
           <a:xfrm>
-            <a:off x="6640920" y="1888920"/>
+            <a:off x="6479640" y="1869840"/>
             <a:ext cx="360" cy="4394160"/>
           </a:xfrm>
           <a:prstGeom prst="line">
@@ -9576,7 +9698,7 @@
         <p:spPr>
           <a:xfrm>
             <a:off x="489600" y="1490040"/>
-            <a:ext cx="1448280" cy="410040"/>
+            <a:ext cx="1447920" cy="409680"/>
           </a:xfrm>
           <a:prstGeom prst="roundRect">
             <a:avLst>
@@ -9639,7 +9761,7 @@
         <p:spPr>
           <a:xfrm>
             <a:off x="9379080" y="6017040"/>
-            <a:ext cx="1053000" cy="290520"/>
+            <a:ext cx="1052640" cy="290160"/>
           </a:xfrm>
           <a:prstGeom prst="roundRect">
             <a:avLst>
@@ -9702,7 +9824,7 @@
         <p:spPr>
           <a:xfrm>
             <a:off x="11062080" y="793080"/>
-            <a:ext cx="843120" cy="255240"/>
+            <a:ext cx="842760" cy="254880"/>
           </a:xfrm>
           <a:prstGeom prst="roundRect">
             <a:avLst>
@@ -9765,7 +9887,7 @@
         <p:spPr>
           <a:xfrm>
             <a:off x="7153200" y="1655640"/>
-            <a:ext cx="2751840" cy="272520"/>
+            <a:ext cx="2751480" cy="272160"/>
           </a:xfrm>
           <a:prstGeom prst="rect">
             <a:avLst/>
@@ -9814,7 +9936,7 @@
         <p:spPr>
           <a:xfrm>
             <a:off x="6427800" y="2001240"/>
-            <a:ext cx="1769040" cy="272520"/>
+            <a:ext cx="1768680" cy="272160"/>
           </a:xfrm>
           <a:prstGeom prst="rect">
             <a:avLst/>
@@ -9863,7 +9985,7 @@
         <p:spPr>
           <a:xfrm>
             <a:off x="8359200" y="2001240"/>
-            <a:ext cx="1769040" cy="272520"/>
+            <a:ext cx="1768680" cy="272160"/>
           </a:xfrm>
           <a:prstGeom prst="rect">
             <a:avLst/>
@@ -9914,7 +10036,7 @@
         <p:spPr>
           <a:xfrm>
             <a:off x="6427800" y="2283840"/>
-            <a:ext cx="1769040" cy="272520"/>
+            <a:ext cx="1768680" cy="272160"/>
           </a:xfrm>
           <a:prstGeom prst="rect">
             <a:avLst/>
@@ -9963,7 +10085,7 @@
         <p:spPr>
           <a:xfrm>
             <a:off x="8359200" y="2283840"/>
-            <a:ext cx="1769040" cy="276120"/>
+            <a:ext cx="1768680" cy="275760"/>
           </a:xfrm>
           <a:prstGeom prst="rect">
             <a:avLst/>
@@ -9991,7 +10113,7 @@
         <p:spPr>
           <a:xfrm>
             <a:off x="6427800" y="2561040"/>
-            <a:ext cx="1769040" cy="272520"/>
+            <a:ext cx="1768680" cy="272160"/>
           </a:xfrm>
           <a:prstGeom prst="rect">
             <a:avLst/>
@@ -10040,7 +10162,7 @@
         <p:spPr>
           <a:xfrm>
             <a:off x="8359200" y="2561040"/>
-            <a:ext cx="1769040" cy="276120"/>
+            <a:ext cx="1768680" cy="275760"/>
           </a:xfrm>
           <a:prstGeom prst="rect">
             <a:avLst/>
@@ -10068,7 +10190,7 @@
         <p:spPr>
           <a:xfrm>
             <a:off x="6427800" y="2831760"/>
-            <a:ext cx="1769040" cy="272520"/>
+            <a:ext cx="1768680" cy="272160"/>
           </a:xfrm>
           <a:prstGeom prst="rect">
             <a:avLst/>
@@ -10117,7 +10239,7 @@
         <p:spPr>
           <a:xfrm>
             <a:off x="8359200" y="2831760"/>
-            <a:ext cx="1769040" cy="272520"/>
+            <a:ext cx="1768680" cy="272160"/>
           </a:xfrm>
           <a:prstGeom prst="rect">
             <a:avLst/>
@@ -10168,7 +10290,7 @@
         <p:spPr>
           <a:xfrm>
             <a:off x="6433920" y="3114000"/>
-            <a:ext cx="1769040" cy="272520"/>
+            <a:ext cx="1768680" cy="272160"/>
           </a:xfrm>
           <a:prstGeom prst="rect">
             <a:avLst/>
@@ -10217,7 +10339,7 @@
         <p:spPr>
           <a:xfrm>
             <a:off x="8365680" y="3114000"/>
-            <a:ext cx="1769040" cy="276120"/>
+            <a:ext cx="1768680" cy="275760"/>
           </a:xfrm>
           <a:prstGeom prst="rect">
             <a:avLst/>
@@ -10245,7 +10367,7 @@
         <p:spPr>
           <a:xfrm>
             <a:off x="6441120" y="3396960"/>
-            <a:ext cx="1769040" cy="272520"/>
+            <a:ext cx="1768680" cy="272160"/>
           </a:xfrm>
           <a:prstGeom prst="rect">
             <a:avLst/>
@@ -10294,7 +10416,7 @@
         <p:spPr>
           <a:xfrm>
             <a:off x="8372520" y="3396960"/>
-            <a:ext cx="1769040" cy="276120"/>
+            <a:ext cx="1768680" cy="275760"/>
           </a:xfrm>
           <a:prstGeom prst="rect">
             <a:avLst/>
@@ -10322,7 +10444,7 @@
         <p:spPr>
           <a:xfrm>
             <a:off x="6441840" y="3682800"/>
-            <a:ext cx="1769040" cy="272520"/>
+            <a:ext cx="1768680" cy="272160"/>
           </a:xfrm>
           <a:prstGeom prst="rect">
             <a:avLst/>
@@ -10371,7 +10493,7 @@
         <p:spPr>
           <a:xfrm>
             <a:off x="8373600" y="3682800"/>
-            <a:ext cx="1769040" cy="276120"/>
+            <a:ext cx="1768680" cy="275760"/>
           </a:xfrm>
           <a:prstGeom prst="rect">
             <a:avLst/>
@@ -10399,7 +10521,7 @@
         <p:spPr>
           <a:xfrm>
             <a:off x="6448680" y="3965400"/>
-            <a:ext cx="1769040" cy="272520"/>
+            <a:ext cx="1768680" cy="272160"/>
           </a:xfrm>
           <a:prstGeom prst="rect">
             <a:avLst/>
@@ -10448,7 +10570,7 @@
         <p:spPr>
           <a:xfrm>
             <a:off x="8380440" y="3965400"/>
-            <a:ext cx="1769040" cy="276120"/>
+            <a:ext cx="1768680" cy="275760"/>
           </a:xfrm>
           <a:prstGeom prst="rect">
             <a:avLst/>
@@ -10476,7 +10598,7 @@
         <p:spPr>
           <a:xfrm>
             <a:off x="6448680" y="4239000"/>
-            <a:ext cx="1769040" cy="272520"/>
+            <a:ext cx="1768680" cy="272160"/>
           </a:xfrm>
           <a:prstGeom prst="rect">
             <a:avLst/>
@@ -10525,7 +10647,7 @@
         <p:spPr>
           <a:xfrm>
             <a:off x="8380440" y="4239000"/>
-            <a:ext cx="1769040" cy="276120"/>
+            <a:ext cx="1768680" cy="275760"/>
           </a:xfrm>
           <a:prstGeom prst="rect">
             <a:avLst/>
@@ -10553,7 +10675,7 @@
         <p:spPr>
           <a:xfrm>
             <a:off x="7289280" y="4603680"/>
-            <a:ext cx="2751840" cy="272520"/>
+            <a:ext cx="2751480" cy="272160"/>
           </a:xfrm>
           <a:prstGeom prst="rect">
             <a:avLst/>
@@ -10601,8 +10723,8 @@
         </p:nvSpPr>
         <p:spPr>
           <a:xfrm>
-            <a:off x="6774840" y="5040720"/>
-            <a:ext cx="1130400" cy="454320"/>
+            <a:off x="6480000" y="5040720"/>
+            <a:ext cx="1424880" cy="453960"/>
           </a:xfrm>
           <a:prstGeom prst="rect">
             <a:avLst/>
@@ -10650,8 +10772,8 @@
         </p:nvSpPr>
         <p:spPr>
           <a:xfrm>
-            <a:off x="7891560" y="5055840"/>
-            <a:ext cx="254520" cy="225000"/>
+            <a:off x="8064000" y="5031360"/>
+            <a:ext cx="254160" cy="224640"/>
           </a:xfrm>
           <a:prstGeom prst="rect">
             <a:avLst/>
@@ -10689,8 +10811,8 @@
         </p:nvSpPr>
         <p:spPr>
           <a:xfrm>
-            <a:off x="6774840" y="5307120"/>
-            <a:ext cx="1130400" cy="454320"/>
+            <a:off x="6479640" y="5307120"/>
+            <a:ext cx="1425240" cy="453960"/>
           </a:xfrm>
           <a:prstGeom prst="rect">
             <a:avLst/>
@@ -10739,7 +10861,7 @@
         <p:spPr>
           <a:xfrm>
             <a:off x="7891560" y="5322240"/>
-            <a:ext cx="254520" cy="225000"/>
+            <a:ext cx="254160" cy="224640"/>
           </a:xfrm>
           <a:prstGeom prst="rect">
             <a:avLst/>
@@ -10777,8 +10899,8 @@
         </p:nvSpPr>
         <p:spPr>
           <a:xfrm>
-            <a:off x="6614280" y="5598720"/>
-            <a:ext cx="1290960" cy="454320"/>
+            <a:off x="6192000" y="5598720"/>
+            <a:ext cx="1712880" cy="453960"/>
           </a:xfrm>
           <a:prstGeom prst="rect">
             <a:avLst/>
@@ -10827,7 +10949,7 @@
         <p:spPr>
           <a:xfrm>
             <a:off x="7891560" y="5613840"/>
-            <a:ext cx="254520" cy="225000"/>
+            <a:ext cx="254160" cy="224640"/>
           </a:xfrm>
           <a:prstGeom prst="rect">
             <a:avLst/>
@@ -10866,7 +10988,7 @@
         <p:spPr>
           <a:xfrm>
             <a:off x="10516320" y="6009840"/>
-            <a:ext cx="1053000" cy="290520"/>
+            <a:ext cx="1052640" cy="290160"/>
           </a:xfrm>
           <a:prstGeom prst="roundRect">
             <a:avLst>
@@ -10929,7 +11051,7 @@
         <p:spPr>
           <a:xfrm>
             <a:off x="5177160" y="2379240"/>
-            <a:ext cx="924120" cy="282240"/>
+            <a:ext cx="923760" cy="281880"/>
           </a:xfrm>
           <a:prstGeom prst="rect">
             <a:avLst/>
@@ -10980,7 +11102,7 @@
         <p:spPr>
           <a:xfrm>
             <a:off x="2394720" y="1692000"/>
-            <a:ext cx="1769040" cy="272520"/>
+            <a:ext cx="1768680" cy="272160"/>
           </a:xfrm>
           <a:prstGeom prst="rect">
             <a:avLst/>
@@ -11029,7 +11151,7 @@
         <p:spPr>
           <a:xfrm>
             <a:off x="4326120" y="1692000"/>
-            <a:ext cx="1769040" cy="272520"/>
+            <a:ext cx="1768680" cy="272160"/>
           </a:xfrm>
           <a:prstGeom prst="rect">
             <a:avLst/>
@@ -11129,7 +11251,7 @@
         <p:spPr>
           <a:xfrm>
             <a:off x="118080" y="121680"/>
-            <a:ext cx="11964960" cy="6660720"/>
+            <a:ext cx="11964600" cy="6660360"/>
           </a:xfrm>
           <a:prstGeom prst="roundRect">
             <a:avLst>
@@ -11172,7 +11294,7 @@
         <p:spPr>
           <a:xfrm>
             <a:off x="629640" y="368640"/>
-            <a:ext cx="1207800" cy="716400"/>
+            <a:ext cx="1207440" cy="716040"/>
           </a:xfrm>
           <a:prstGeom prst="rect">
             <a:avLst/>
@@ -11225,7 +11347,7 @@
         <p:spPr>
           <a:xfrm>
             <a:off x="10180440" y="138600"/>
-            <a:ext cx="1724760" cy="603360"/>
+            <a:ext cx="1724400" cy="603000"/>
           </a:xfrm>
           <a:prstGeom prst="rect">
             <a:avLst/>
@@ -11336,7 +11458,7 @@
         <p:spPr>
           <a:xfrm>
             <a:off x="489600" y="1490040"/>
-            <a:ext cx="1448280" cy="410040"/>
+            <a:ext cx="1447920" cy="409680"/>
           </a:xfrm>
           <a:prstGeom prst="roundRect">
             <a:avLst>
@@ -11399,7 +11521,7 @@
         <p:spPr>
           <a:xfrm>
             <a:off x="11062080" y="793080"/>
-            <a:ext cx="843120" cy="255240"/>
+            <a:ext cx="842760" cy="254880"/>
           </a:xfrm>
           <a:prstGeom prst="roundRect">
             <a:avLst>
@@ -11462,7 +11584,7 @@
         <p:spPr>
           <a:xfrm>
             <a:off x="489600" y="2015640"/>
-            <a:ext cx="1448280" cy="410040"/>
+            <a:ext cx="1447920" cy="409680"/>
           </a:xfrm>
           <a:prstGeom prst="roundRect">
             <a:avLst>
@@ -17435,7 +17557,7 @@
         <p:spPr>
           <a:xfrm>
             <a:off x="3780000" y="4034520"/>
-            <a:ext cx="1311840" cy="931680"/>
+            <a:ext cx="1311480" cy="931320"/>
           </a:xfrm>
           <a:prstGeom prst="rect">
             <a:avLst/>
@@ -17454,7 +17576,7 @@
         <p:spPr>
           <a:xfrm>
             <a:off x="5265000" y="2202480"/>
-            <a:ext cx="448920" cy="181440"/>
+            <a:ext cx="448560" cy="181080"/>
           </a:xfrm>
           <a:prstGeom prst="rect">
             <a:avLst/>
@@ -17515,7 +17637,7 @@
         <p:spPr>
           <a:xfrm>
             <a:off x="5265000" y="2592720"/>
-            <a:ext cx="448920" cy="181440"/>
+            <a:ext cx="448560" cy="181080"/>
           </a:xfrm>
           <a:prstGeom prst="rect">
             <a:avLst/>
@@ -17576,7 +17698,7 @@
         <p:spPr>
           <a:xfrm>
             <a:off x="5265000" y="3021120"/>
-            <a:ext cx="448920" cy="181440"/>
+            <a:ext cx="448560" cy="181080"/>
           </a:xfrm>
           <a:prstGeom prst="rect">
             <a:avLst/>
@@ -17637,7 +17759,7 @@
         <p:spPr>
           <a:xfrm>
             <a:off x="5265000" y="3433680"/>
-            <a:ext cx="448920" cy="181440"/>
+            <a:ext cx="448560" cy="181080"/>
           </a:xfrm>
           <a:prstGeom prst="rect">
             <a:avLst/>
@@ -17698,7 +17820,7 @@
         <p:spPr>
           <a:xfrm>
             <a:off x="5265000" y="3856320"/>
-            <a:ext cx="448920" cy="181440"/>
+            <a:ext cx="448560" cy="181080"/>
           </a:xfrm>
           <a:prstGeom prst="rect">
             <a:avLst/>
@@ -17759,7 +17881,7 @@
         <p:spPr>
           <a:xfrm>
             <a:off x="5265000" y="4279680"/>
-            <a:ext cx="448920" cy="181440"/>
+            <a:ext cx="448560" cy="181080"/>
           </a:xfrm>
           <a:prstGeom prst="rect">
             <a:avLst/>
@@ -17820,7 +17942,7 @@
         <p:spPr>
           <a:xfrm>
             <a:off x="7062840" y="2207880"/>
-            <a:ext cx="448920" cy="181440"/>
+            <a:ext cx="448560" cy="181080"/>
           </a:xfrm>
           <a:prstGeom prst="rect">
             <a:avLst/>
@@ -17881,7 +18003,7 @@
         <p:spPr>
           <a:xfrm>
             <a:off x="7062840" y="2598480"/>
-            <a:ext cx="448920" cy="181440"/>
+            <a:ext cx="448560" cy="181080"/>
           </a:xfrm>
           <a:prstGeom prst="rect">
             <a:avLst/>
@@ -17942,7 +18064,7 @@
         <p:spPr>
           <a:xfrm>
             <a:off x="7062840" y="3026880"/>
-            <a:ext cx="448920" cy="181440"/>
+            <a:ext cx="448560" cy="181080"/>
           </a:xfrm>
           <a:prstGeom prst="rect">
             <a:avLst/>
@@ -18003,7 +18125,7 @@
         <p:spPr>
           <a:xfrm>
             <a:off x="7062840" y="3439080"/>
-            <a:ext cx="448920" cy="181440"/>
+            <a:ext cx="448560" cy="181080"/>
           </a:xfrm>
           <a:prstGeom prst="rect">
             <a:avLst/>
@@ -18064,7 +18186,7 @@
         <p:spPr>
           <a:xfrm>
             <a:off x="7062840" y="3861720"/>
-            <a:ext cx="448920" cy="181440"/>
+            <a:ext cx="448560" cy="181080"/>
           </a:xfrm>
           <a:prstGeom prst="rect">
             <a:avLst/>
@@ -18125,7 +18247,7 @@
         <p:spPr>
           <a:xfrm>
             <a:off x="7062840" y="4285080"/>
-            <a:ext cx="448920" cy="181440"/>
+            <a:ext cx="448560" cy="181080"/>
           </a:xfrm>
           <a:prstGeom prst="rect">
             <a:avLst/>
@@ -18186,7 +18308,7 @@
         <p:spPr>
           <a:xfrm>
             <a:off x="8895600" y="2217600"/>
-            <a:ext cx="448920" cy="181440"/>
+            <a:ext cx="448560" cy="181080"/>
           </a:xfrm>
           <a:prstGeom prst="rect">
             <a:avLst/>
@@ -18247,7 +18369,7 @@
         <p:spPr>
           <a:xfrm>
             <a:off x="8895600" y="2608200"/>
-            <a:ext cx="448920" cy="181440"/>
+            <a:ext cx="448560" cy="181080"/>
           </a:xfrm>
           <a:prstGeom prst="rect">
             <a:avLst/>
@@ -18308,7 +18430,7 @@
         <p:spPr>
           <a:xfrm>
             <a:off x="8895600" y="3036600"/>
-            <a:ext cx="448920" cy="181440"/>
+            <a:ext cx="448560" cy="181080"/>
           </a:xfrm>
           <a:prstGeom prst="rect">
             <a:avLst/>
@@ -18369,7 +18491,7 @@
         <p:spPr>
           <a:xfrm>
             <a:off x="8895600" y="3448800"/>
-            <a:ext cx="448920" cy="181440"/>
+            <a:ext cx="448560" cy="181080"/>
           </a:xfrm>
           <a:prstGeom prst="rect">
             <a:avLst/>
@@ -18430,7 +18552,7 @@
         <p:spPr>
           <a:xfrm>
             <a:off x="8895600" y="3871440"/>
-            <a:ext cx="448920" cy="181440"/>
+            <a:ext cx="448560" cy="181080"/>
           </a:xfrm>
           <a:prstGeom prst="rect">
             <a:avLst/>
@@ -18491,7 +18613,7 @@
         <p:spPr>
           <a:xfrm>
             <a:off x="8895600" y="4295160"/>
-            <a:ext cx="448920" cy="181440"/>
+            <a:ext cx="448560" cy="181080"/>
           </a:xfrm>
           <a:prstGeom prst="rect">
             <a:avLst/>
@@ -18552,7 +18674,7 @@
         <p:spPr>
           <a:xfrm>
             <a:off x="10839600" y="2179800"/>
-            <a:ext cx="452160" cy="181440"/>
+            <a:ext cx="451800" cy="181080"/>
           </a:xfrm>
           <a:prstGeom prst="rect">
             <a:avLst/>
@@ -18613,7 +18735,7 @@
         <p:spPr>
           <a:xfrm>
             <a:off x="10839600" y="2575440"/>
-            <a:ext cx="452160" cy="181440"/>
+            <a:ext cx="451800" cy="181080"/>
           </a:xfrm>
           <a:prstGeom prst="rect">
             <a:avLst/>
@@ -18674,7 +18796,7 @@
         <p:spPr>
           <a:xfrm>
             <a:off x="10839600" y="2998800"/>
-            <a:ext cx="452160" cy="181440"/>
+            <a:ext cx="451800" cy="181080"/>
           </a:xfrm>
           <a:prstGeom prst="rect">
             <a:avLst/>
@@ -18735,7 +18857,7 @@
         <p:spPr>
           <a:xfrm>
             <a:off x="10839600" y="3411000"/>
-            <a:ext cx="452160" cy="181440"/>
+            <a:ext cx="451800" cy="181080"/>
           </a:xfrm>
           <a:prstGeom prst="rect">
             <a:avLst/>
@@ -18796,7 +18918,7 @@
         <p:spPr>
           <a:xfrm>
             <a:off x="10839600" y="3834000"/>
-            <a:ext cx="452160" cy="181440"/>
+            <a:ext cx="451800" cy="181080"/>
           </a:xfrm>
           <a:prstGeom prst="rect">
             <a:avLst/>
@@ -18857,7 +18979,7 @@
         <p:spPr>
           <a:xfrm>
             <a:off x="10839600" y="4257360"/>
-            <a:ext cx="452160" cy="181440"/>
+            <a:ext cx="451800" cy="181080"/>
           </a:xfrm>
           <a:prstGeom prst="rect">
             <a:avLst/>
@@ -18922,7 +19044,7 @@
         <p:spPr>
           <a:xfrm>
             <a:off x="6825960" y="4267800"/>
-            <a:ext cx="136440" cy="136440"/>
+            <a:ext cx="136080" cy="136080"/>
           </a:xfrm>
           <a:prstGeom prst="rect">
             <a:avLst/>
@@ -18945,7 +19067,7 @@
         <p:spPr>
           <a:xfrm>
             <a:off x="6825960" y="2221560"/>
-            <a:ext cx="136440" cy="136440"/>
+            <a:ext cx="136080" cy="136080"/>
           </a:xfrm>
           <a:prstGeom prst="rect">
             <a:avLst/>
@@ -18968,7 +19090,7 @@
         <p:spPr>
           <a:xfrm>
             <a:off x="6816960" y="2654280"/>
-            <a:ext cx="136440" cy="136440"/>
+            <a:ext cx="136080" cy="136080"/>
           </a:xfrm>
           <a:prstGeom prst="rect">
             <a:avLst/>
@@ -18991,7 +19113,7 @@
         <p:spPr>
           <a:xfrm>
             <a:off x="6818760" y="3053520"/>
-            <a:ext cx="136440" cy="136440"/>
+            <a:ext cx="136080" cy="136080"/>
           </a:xfrm>
           <a:prstGeom prst="rect">
             <a:avLst/>
@@ -19014,7 +19136,7 @@
         <p:spPr>
           <a:xfrm>
             <a:off x="6825960" y="3425040"/>
-            <a:ext cx="136440" cy="136440"/>
+            <a:ext cx="136080" cy="136080"/>
           </a:xfrm>
           <a:prstGeom prst="rect">
             <a:avLst/>
@@ -19037,7 +19159,7 @@
         <p:spPr>
           <a:xfrm>
             <a:off x="6825960" y="3851640"/>
-            <a:ext cx="136440" cy="136440"/>
+            <a:ext cx="136080" cy="136080"/>
           </a:xfrm>
           <a:prstGeom prst="rect">
             <a:avLst/>
@@ -19060,7 +19182,7 @@
         <p:spPr>
           <a:xfrm>
             <a:off x="8692200" y="4267800"/>
-            <a:ext cx="136440" cy="136440"/>
+            <a:ext cx="136080" cy="136080"/>
           </a:xfrm>
           <a:prstGeom prst="rect">
             <a:avLst/>
@@ -19083,7 +19205,7 @@
         <p:spPr>
           <a:xfrm>
             <a:off x="8692200" y="2221560"/>
-            <a:ext cx="136440" cy="136440"/>
+            <a:ext cx="136080" cy="136080"/>
           </a:xfrm>
           <a:prstGeom prst="rect">
             <a:avLst/>
@@ -19106,7 +19228,7 @@
         <p:spPr>
           <a:xfrm>
             <a:off x="8683200" y="2654280"/>
-            <a:ext cx="136440" cy="136440"/>
+            <a:ext cx="136080" cy="136080"/>
           </a:xfrm>
           <a:prstGeom prst="rect">
             <a:avLst/>
@@ -19129,7 +19251,7 @@
         <p:spPr>
           <a:xfrm>
             <a:off x="8685000" y="3053520"/>
-            <a:ext cx="136440" cy="136440"/>
+            <a:ext cx="136080" cy="136080"/>
           </a:xfrm>
           <a:prstGeom prst="rect">
             <a:avLst/>
@@ -19152,7 +19274,7 @@
         <p:spPr>
           <a:xfrm>
             <a:off x="8692200" y="3425040"/>
-            <a:ext cx="136440" cy="136440"/>
+            <a:ext cx="136080" cy="136080"/>
           </a:xfrm>
           <a:prstGeom prst="rect">
             <a:avLst/>
@@ -19175,7 +19297,7 @@
         <p:spPr>
           <a:xfrm>
             <a:off x="8692200" y="3851640"/>
-            <a:ext cx="136440" cy="136440"/>
+            <a:ext cx="136080" cy="136080"/>
           </a:xfrm>
           <a:prstGeom prst="rect">
             <a:avLst/>
@@ -19198,7 +19320,7 @@
         <p:spPr>
           <a:xfrm>
             <a:off x="10581480" y="4267800"/>
-            <a:ext cx="136440" cy="136440"/>
+            <a:ext cx="136080" cy="136080"/>
           </a:xfrm>
           <a:prstGeom prst="rect">
             <a:avLst/>
@@ -19221,7 +19343,7 @@
         <p:spPr>
           <a:xfrm>
             <a:off x="10581480" y="2221560"/>
-            <a:ext cx="136440" cy="136440"/>
+            <a:ext cx="136080" cy="136080"/>
           </a:xfrm>
           <a:prstGeom prst="rect">
             <a:avLst/>
@@ -19244,7 +19366,7 @@
         <p:spPr>
           <a:xfrm>
             <a:off x="10572480" y="2654280"/>
-            <a:ext cx="136440" cy="136440"/>
+            <a:ext cx="136080" cy="136080"/>
           </a:xfrm>
           <a:prstGeom prst="rect">
             <a:avLst/>
@@ -19267,7 +19389,7 @@
         <p:spPr>
           <a:xfrm>
             <a:off x="10574280" y="3053520"/>
-            <a:ext cx="136440" cy="136440"/>
+            <a:ext cx="136080" cy="136080"/>
           </a:xfrm>
           <a:prstGeom prst="rect">
             <a:avLst/>
@@ -19290,7 +19412,7 @@
         <p:spPr>
           <a:xfrm>
             <a:off x="10581480" y="3425040"/>
-            <a:ext cx="136440" cy="136440"/>
+            <a:ext cx="136080" cy="136080"/>
           </a:xfrm>
           <a:prstGeom prst="rect">
             <a:avLst/>
@@ -19313,7 +19435,7 @@
         <p:spPr>
           <a:xfrm>
             <a:off x="10581480" y="3851640"/>
-            <a:ext cx="136440" cy="136440"/>
+            <a:ext cx="136080" cy="136080"/>
           </a:xfrm>
           <a:prstGeom prst="rect">
             <a:avLst/>
@@ -19331,7 +19453,7 @@
         </p:nvGraphicFramePr>
         <p:xfrm>
           <a:off x="2697480" y="5358960"/>
-          <a:ext cx="8678520" cy="620280"/>
+          <a:ext cx="8678520" cy="777240"/>
         </p:xfrm>
         <a:graphic>
           <a:graphicData uri="http://schemas.openxmlformats.org/drawingml/2006/table">
@@ -20778,7 +20900,7 @@
         <p:spPr>
           <a:xfrm>
             <a:off x="2605320" y="1314720"/>
-            <a:ext cx="1177560" cy="272520"/>
+            <a:ext cx="1177200" cy="272160"/>
           </a:xfrm>
           <a:prstGeom prst="rect">
             <a:avLst/>
@@ -20839,7 +20961,7 @@
         <p:spPr>
           <a:xfrm>
             <a:off x="2649960" y="4806360"/>
-            <a:ext cx="682200" cy="272520"/>
+            <a:ext cx="681840" cy="272160"/>
           </a:xfrm>
           <a:prstGeom prst="rect">
             <a:avLst/>
@@ -20900,7 +21022,7 @@
         <p:spPr>
           <a:xfrm>
             <a:off x="5265000" y="5690880"/>
-            <a:ext cx="448920" cy="181440"/>
+            <a:ext cx="448560" cy="181080"/>
           </a:xfrm>
           <a:prstGeom prst="rect">
             <a:avLst/>
@@ -20961,7 +21083,7 @@
         <p:spPr>
           <a:xfrm>
             <a:off x="7062840" y="5696280"/>
-            <a:ext cx="448920" cy="181440"/>
+            <a:ext cx="448560" cy="181080"/>
           </a:xfrm>
           <a:prstGeom prst="rect">
             <a:avLst/>
@@ -21022,7 +21144,7 @@
         <p:spPr>
           <a:xfrm>
             <a:off x="8895600" y="5706000"/>
-            <a:ext cx="448920" cy="181440"/>
+            <a:ext cx="448560" cy="181080"/>
           </a:xfrm>
           <a:prstGeom prst="rect">
             <a:avLst/>
@@ -21083,7 +21205,7 @@
         <p:spPr>
           <a:xfrm>
             <a:off x="10839600" y="5668560"/>
-            <a:ext cx="452160" cy="181440"/>
+            <a:ext cx="451800" cy="181080"/>
           </a:xfrm>
           <a:prstGeom prst="rect">
             <a:avLst/>
@@ -21148,7 +21270,7 @@
         <p:spPr>
           <a:xfrm>
             <a:off x="6825960" y="5679000"/>
-            <a:ext cx="136440" cy="136440"/>
+            <a:ext cx="136080" cy="136080"/>
           </a:xfrm>
           <a:prstGeom prst="rect">
             <a:avLst/>
@@ -21171,7 +21293,7 @@
         <p:spPr>
           <a:xfrm>
             <a:off x="8692200" y="5679000"/>
-            <a:ext cx="136440" cy="136440"/>
+            <a:ext cx="136080" cy="136080"/>
           </a:xfrm>
           <a:prstGeom prst="rect">
             <a:avLst/>
@@ -21194,7 +21316,7 @@
         <p:spPr>
           <a:xfrm>
             <a:off x="10581480" y="5679000"/>
-            <a:ext cx="136440" cy="136440"/>
+            <a:ext cx="136080" cy="136080"/>
           </a:xfrm>
           <a:prstGeom prst="rect">
             <a:avLst/>
@@ -21262,7 +21384,7 @@
         <p:spPr>
           <a:xfrm>
             <a:off x="118080" y="121680"/>
-            <a:ext cx="11964960" cy="6660720"/>
+            <a:ext cx="11964600" cy="6660360"/>
           </a:xfrm>
           <a:prstGeom prst="roundRect">
             <a:avLst>
@@ -21305,7 +21427,7 @@
         <p:spPr>
           <a:xfrm>
             <a:off x="629640" y="368640"/>
-            <a:ext cx="1207800" cy="716400"/>
+            <a:ext cx="1207440" cy="716040"/>
           </a:xfrm>
           <a:prstGeom prst="rect">
             <a:avLst/>
@@ -21358,7 +21480,7 @@
         <p:spPr>
           <a:xfrm>
             <a:off x="10180440" y="138600"/>
-            <a:ext cx="1724760" cy="603360"/>
+            <a:ext cx="1724400" cy="603000"/>
           </a:xfrm>
           <a:prstGeom prst="rect">
             <a:avLst/>
@@ -21469,7 +21591,7 @@
         <p:spPr>
           <a:xfrm>
             <a:off x="489600" y="1490040"/>
-            <a:ext cx="1448280" cy="410040"/>
+            <a:ext cx="1447920" cy="409680"/>
           </a:xfrm>
           <a:prstGeom prst="roundRect">
             <a:avLst>
@@ -21532,7 +21654,7 @@
         <p:spPr>
           <a:xfrm>
             <a:off x="11062080" y="793080"/>
-            <a:ext cx="843120" cy="255240"/>
+            <a:ext cx="842760" cy="254880"/>
           </a:xfrm>
           <a:prstGeom prst="roundRect">
             <a:avLst>
@@ -21595,7 +21717,7 @@
         <p:spPr>
           <a:xfrm>
             <a:off x="489600" y="2015640"/>
-            <a:ext cx="1448280" cy="410040"/>
+            <a:ext cx="1447920" cy="409680"/>
           </a:xfrm>
           <a:prstGeom prst="roundRect">
             <a:avLst>
@@ -21658,7 +21780,7 @@
         <p:spPr>
           <a:xfrm>
             <a:off x="472320" y="2518920"/>
-            <a:ext cx="1448280" cy="410040"/>
+            <a:ext cx="1447920" cy="409680"/>
           </a:xfrm>
           <a:prstGeom prst="roundRect">
             <a:avLst>
@@ -21720,7 +21842,7 @@
         </p:nvGraphicFramePr>
         <p:xfrm>
           <a:off x="2736360" y="2226240"/>
-          <a:ext cx="9204120" cy="1937520"/>
+          <a:ext cx="9204120" cy="2522160"/>
         </p:xfrm>
         <a:graphic>
           <a:graphicData uri="http://schemas.openxmlformats.org/drawingml/2006/table">
@@ -25553,7 +25675,7 @@
         <p:spPr>
           <a:xfrm>
             <a:off x="10485000" y="1573560"/>
-            <a:ext cx="1340280" cy="243000"/>
+            <a:ext cx="1339920" cy="242640"/>
           </a:xfrm>
           <a:prstGeom prst="rect">
             <a:avLst/>
@@ -25584,7 +25706,7 @@
         <p:spPr>
           <a:xfrm>
             <a:off x="9832680" y="1582200"/>
-            <a:ext cx="702000" cy="272520"/>
+            <a:ext cx="701640" cy="272160"/>
           </a:xfrm>
           <a:prstGeom prst="rect">
             <a:avLst/>
@@ -25637,7 +25759,7 @@
         <p:spPr>
           <a:xfrm>
             <a:off x="2834640" y="1567440"/>
-            <a:ext cx="678600" cy="280080"/>
+            <a:ext cx="678240" cy="279720"/>
           </a:xfrm>
           <a:prstGeom prst="rect">
             <a:avLst/>
@@ -25660,7 +25782,7 @@
         <p:spPr>
           <a:xfrm>
             <a:off x="2850840" y="4261680"/>
-            <a:ext cx="1022400" cy="258480"/>
+            <a:ext cx="1022040" cy="258120"/>
           </a:xfrm>
           <a:prstGeom prst="rect">
             <a:avLst/>
@@ -25682,8 +25804,8 @@
         </p:blipFill>
         <p:spPr>
           <a:xfrm>
-            <a:off x="6112080" y="4301640"/>
-            <a:ext cx="5961240" cy="312480"/>
+            <a:off x="5991120" y="4896000"/>
+            <a:ext cx="5960880" cy="312120"/>
           </a:xfrm>
           <a:prstGeom prst="rect">
             <a:avLst/>
@@ -25706,7 +25828,7 @@
         <p:spPr>
           <a:xfrm>
             <a:off x="3479040" y="4672800"/>
-            <a:ext cx="2252520" cy="2000520"/>
+            <a:ext cx="2252160" cy="2000160"/>
           </a:xfrm>
           <a:prstGeom prst="rect">
             <a:avLst/>
@@ -25774,7 +25896,7 @@
         <p:spPr>
           <a:xfrm>
             <a:off x="118080" y="121680"/>
-            <a:ext cx="11964960" cy="6660720"/>
+            <a:ext cx="11964600" cy="6660360"/>
           </a:xfrm>
           <a:prstGeom prst="roundRect">
             <a:avLst>
@@ -25817,7 +25939,7 @@
         <p:spPr>
           <a:xfrm>
             <a:off x="629640" y="368640"/>
-            <a:ext cx="1207800" cy="716400"/>
+            <a:ext cx="1207440" cy="716040"/>
           </a:xfrm>
           <a:prstGeom prst="rect">
             <a:avLst/>
@@ -25870,7 +25992,7 @@
         <p:spPr>
           <a:xfrm>
             <a:off x="10180440" y="138600"/>
-            <a:ext cx="1724760" cy="603360"/>
+            <a:ext cx="1724400" cy="603000"/>
           </a:xfrm>
           <a:prstGeom prst="rect">
             <a:avLst/>
@@ -25981,7 +26103,7 @@
         <p:spPr>
           <a:xfrm>
             <a:off x="11062080" y="793080"/>
-            <a:ext cx="843120" cy="255240"/>
+            <a:ext cx="842760" cy="254880"/>
           </a:xfrm>
           <a:prstGeom prst="roundRect">
             <a:avLst>
@@ -26044,7 +26166,7 @@
         <p:spPr>
           <a:xfrm>
             <a:off x="489600" y="1490040"/>
-            <a:ext cx="1448280" cy="410040"/>
+            <a:ext cx="1447920" cy="409680"/>
           </a:xfrm>
           <a:prstGeom prst="roundRect">
             <a:avLst>
@@ -26107,7 +26229,7 @@
         <p:spPr>
           <a:xfrm>
             <a:off x="10485000" y="1573560"/>
-            <a:ext cx="1340280" cy="243000"/>
+            <a:ext cx="1339920" cy="242640"/>
           </a:xfrm>
           <a:prstGeom prst="rect">
             <a:avLst/>
@@ -26138,7 +26260,7 @@
         <p:spPr>
           <a:xfrm>
             <a:off x="9832680" y="1582200"/>
-            <a:ext cx="702000" cy="272520"/>
+            <a:ext cx="701640" cy="272160"/>
           </a:xfrm>
           <a:prstGeom prst="rect">
             <a:avLst/>
@@ -26191,7 +26313,7 @@
         <p:spPr>
           <a:xfrm>
             <a:off x="2850840" y="4261680"/>
-            <a:ext cx="1022400" cy="258480"/>
+            <a:ext cx="1022040" cy="258120"/>
           </a:xfrm>
           <a:prstGeom prst="rect">
             <a:avLst/>
@@ -26214,7 +26336,7 @@
         <p:spPr>
           <a:xfrm>
             <a:off x="6112080" y="4301640"/>
-            <a:ext cx="5961240" cy="312480"/>
+            <a:ext cx="5960880" cy="312120"/>
           </a:xfrm>
           <a:prstGeom prst="rect">
             <a:avLst/>
@@ -26237,7 +26359,7 @@
         <p:spPr>
           <a:xfrm>
             <a:off x="3479040" y="4672800"/>
-            <a:ext cx="2252520" cy="2000520"/>
+            <a:ext cx="2252160" cy="2000160"/>
           </a:xfrm>
           <a:prstGeom prst="rect">
             <a:avLst/>
@@ -26260,7 +26382,7 @@
         <p:spPr>
           <a:xfrm>
             <a:off x="2834640" y="1567440"/>
-            <a:ext cx="678600" cy="280080"/>
+            <a:ext cx="678240" cy="279720"/>
           </a:xfrm>
           <a:prstGeom prst="rect">
             <a:avLst/>

</xml_diff>